<commit_message>
Argument + column "time" renamed to "per" (period). Avoids confusion of time resolution vs period. Unifies res/var/per three letter combination (resolution/variable/period)
</commit_message>
<xml_diff>
--- a/PackageSchematic.pptx
+++ b/PackageSchematic.pptx
@@ -106,7 +106,18 @@
   </p:defaultTextStyle>
   <p:extLst>
     <p:ext uri="{EFAFB233-063F-42B5-8137-9DF3F51BA10A}">
-      <p15:sldGuideLst xmlns:p15="http://schemas.microsoft.com/office/powerpoint/2012/main" xmlns=""/>
+      <p15:sldGuideLst xmlns:p15="http://schemas.microsoft.com/office/powerpoint/2012/main">
+        <p15:guide id="1" orient="horz" pos="1927">
+          <p15:clr>
+            <a:srgbClr val="A4A3A4"/>
+          </p15:clr>
+        </p15:guide>
+        <p15:guide id="2" pos="2880">
+          <p15:clr>
+            <a:srgbClr val="A4A3A4"/>
+          </p15:clr>
+        </p15:guide>
+      </p15:sldGuideLst>
     </p:ext>
   </p:extLst>
 </p:presentation>
@@ -243,7 +254,7 @@
           <a:p>
             <a:fld id="{300DB245-849F-4AAA-AD3E-676A6FA9CB3B}" type="datetimeFigureOut">
               <a:rPr lang="de-DE" smtClean="0"/>
-              <a:t>19.11.2016</a:t>
+              <a:t>22.11.2016</a:t>
             </a:fld>
             <a:endParaRPr lang="de-DE"/>
           </a:p>
@@ -413,7 +424,7 @@
           <a:p>
             <a:fld id="{300DB245-849F-4AAA-AD3E-676A6FA9CB3B}" type="datetimeFigureOut">
               <a:rPr lang="de-DE" smtClean="0"/>
-              <a:t>19.11.2016</a:t>
+              <a:t>22.11.2016</a:t>
             </a:fld>
             <a:endParaRPr lang="de-DE"/>
           </a:p>
@@ -593,7 +604,7 @@
           <a:p>
             <a:fld id="{300DB245-849F-4AAA-AD3E-676A6FA9CB3B}" type="datetimeFigureOut">
               <a:rPr lang="de-DE" smtClean="0"/>
-              <a:t>19.11.2016</a:t>
+              <a:t>22.11.2016</a:t>
             </a:fld>
             <a:endParaRPr lang="de-DE"/>
           </a:p>
@@ -763,7 +774,7 @@
           <a:p>
             <a:fld id="{300DB245-849F-4AAA-AD3E-676A6FA9CB3B}" type="datetimeFigureOut">
               <a:rPr lang="de-DE" smtClean="0"/>
-              <a:t>19.11.2016</a:t>
+              <a:t>22.11.2016</a:t>
             </a:fld>
             <a:endParaRPr lang="de-DE"/>
           </a:p>
@@ -1007,7 +1018,7 @@
           <a:p>
             <a:fld id="{300DB245-849F-4AAA-AD3E-676A6FA9CB3B}" type="datetimeFigureOut">
               <a:rPr lang="de-DE" smtClean="0"/>
-              <a:t>19.11.2016</a:t>
+              <a:t>22.11.2016</a:t>
             </a:fld>
             <a:endParaRPr lang="de-DE"/>
           </a:p>
@@ -1239,7 +1250,7 @@
           <a:p>
             <a:fld id="{300DB245-849F-4AAA-AD3E-676A6FA9CB3B}" type="datetimeFigureOut">
               <a:rPr lang="de-DE" smtClean="0"/>
-              <a:t>19.11.2016</a:t>
+              <a:t>22.11.2016</a:t>
             </a:fld>
             <a:endParaRPr lang="de-DE"/>
           </a:p>
@@ -1606,7 +1617,7 @@
           <a:p>
             <a:fld id="{300DB245-849F-4AAA-AD3E-676A6FA9CB3B}" type="datetimeFigureOut">
               <a:rPr lang="de-DE" smtClean="0"/>
-              <a:t>19.11.2016</a:t>
+              <a:t>22.11.2016</a:t>
             </a:fld>
             <a:endParaRPr lang="de-DE"/>
           </a:p>
@@ -1724,7 +1735,7 @@
           <a:p>
             <a:fld id="{300DB245-849F-4AAA-AD3E-676A6FA9CB3B}" type="datetimeFigureOut">
               <a:rPr lang="de-DE" smtClean="0"/>
-              <a:t>19.11.2016</a:t>
+              <a:t>22.11.2016</a:t>
             </a:fld>
             <a:endParaRPr lang="de-DE"/>
           </a:p>
@@ -1819,7 +1830,7 @@
           <a:p>
             <a:fld id="{300DB245-849F-4AAA-AD3E-676A6FA9CB3B}" type="datetimeFigureOut">
               <a:rPr lang="de-DE" smtClean="0"/>
-              <a:t>19.11.2016</a:t>
+              <a:t>22.11.2016</a:t>
             </a:fld>
             <a:endParaRPr lang="de-DE"/>
           </a:p>
@@ -2096,7 +2107,7 @@
           <a:p>
             <a:fld id="{300DB245-849F-4AAA-AD3E-676A6FA9CB3B}" type="datetimeFigureOut">
               <a:rPr lang="de-DE" smtClean="0"/>
-              <a:t>19.11.2016</a:t>
+              <a:t>22.11.2016</a:t>
             </a:fld>
             <a:endParaRPr lang="de-DE"/>
           </a:p>
@@ -2353,7 +2364,7 @@
           <a:p>
             <a:fld id="{300DB245-849F-4AAA-AD3E-676A6FA9CB3B}" type="datetimeFigureOut">
               <a:rPr lang="de-DE" smtClean="0"/>
-              <a:t>19.11.2016</a:t>
+              <a:t>22.11.2016</a:t>
             </a:fld>
             <a:endParaRPr lang="de-DE"/>
           </a:p>
@@ -2566,7 +2577,7 @@
           <a:p>
             <a:fld id="{300DB245-849F-4AAA-AD3E-676A6FA9CB3B}" type="datetimeFigureOut">
               <a:rPr lang="de-DE" smtClean="0"/>
-              <a:t>19.11.2016</a:t>
+              <a:t>22.11.2016</a:t>
             </a:fld>
             <a:endParaRPr lang="de-DE"/>
           </a:p>
@@ -2979,7 +2990,7 @@
         </p:nvSpPr>
         <p:spPr>
           <a:xfrm>
-            <a:off x="171317" y="915294"/>
+            <a:off x="250521" y="3189795"/>
             <a:ext cx="2084995" cy="396000"/>
           </a:xfrm>
           <a:prstGeom prst="roundRect">
@@ -3021,15 +3032,7 @@
                   <a:schemeClr val="accent2"/>
                 </a:solidFill>
               </a:rPr>
-              <a:t>createI</a:t>
-            </a:r>
-            <a:r>
-              <a:rPr lang="de-DE" sz="3200" err="1" smtClean="0">
-                <a:solidFill>
-                  <a:schemeClr val="accent2"/>
-                </a:solidFill>
-              </a:rPr>
-              <a:t>ndex</a:t>
+              <a:t>createIndex</a:t>
             </a:r>
             <a:endParaRPr lang="de-DE" sz="3200">
               <a:solidFill>
@@ -3047,7 +3050,7 @@
         </p:nvSpPr>
         <p:spPr>
           <a:xfrm>
-            <a:off x="171318" y="280904"/>
+            <a:off x="250521" y="2566839"/>
             <a:ext cx="2084994" cy="396000"/>
           </a:xfrm>
           <a:prstGeom prst="roundRect">
@@ -3107,7 +3110,7 @@
         </p:nvSpPr>
         <p:spPr>
           <a:xfrm>
-            <a:off x="6531444" y="4099703"/>
+            <a:off x="4701344" y="4605734"/>
             <a:ext cx="1980000" cy="396000"/>
           </a:xfrm>
           <a:prstGeom prst="roundRect">
@@ -3167,14 +3170,16 @@
         </p:nvSpPr>
         <p:spPr>
           <a:xfrm>
-            <a:off x="276313" y="4535693"/>
-            <a:ext cx="1980000" cy="1065205"/>
+            <a:off x="479336" y="599302"/>
+            <a:ext cx="1980000" cy="1733519"/>
           </a:xfrm>
           <a:prstGeom prst="roundRect">
             <a:avLst/>
           </a:prstGeom>
           <a:solidFill>
-            <a:schemeClr val="bg2">
+            <a:schemeClr val="accent5">
+              <a:lumMod val="40000"/>
+              <a:lumOff val="60000"/>
               <a:alpha val="91000"/>
             </a:schemeClr>
           </a:solidFill>
@@ -3206,25 +3211,53 @@
             <a:r>
               <a:rPr lang="de-DE" sz="3200" smtClean="0">
                 <a:solidFill>
-                  <a:schemeClr val="accent2"/>
+                  <a:schemeClr val="tx1"/>
                 </a:solidFill>
               </a:rPr>
-              <a:t>dirDWD</a:t>
+              <a:t>rdwd</a:t>
             </a:r>
           </a:p>
           <a:p>
             <a:pPr algn="ctr"/>
+            <a:r>
+              <a:rPr lang="de-DE" sz="3200">
+                <a:solidFill>
+                  <a:schemeClr val="tx1"/>
+                </a:solidFill>
+              </a:rPr>
+              <a:t>s</a:t>
+            </a:r>
             <a:r>
               <a:rPr lang="de-DE" sz="3200" smtClean="0">
                 <a:solidFill>
-                  <a:schemeClr val="accent2"/>
+                  <a:schemeClr val="tx1"/>
                 </a:solidFill>
               </a:rPr>
-              <a:t>fileDWD</a:t>
-            </a:r>
-            <a:endParaRPr lang="de-DE" sz="3200">
+              <a:t>tructure</a:t>
+            </a:r>
+          </a:p>
+          <a:p>
+            <a:pPr algn="ctr"/>
+            <a:r>
+              <a:rPr lang="de-DE" sz="1400" smtClean="0">
+                <a:solidFill>
+                  <a:schemeClr val="tx1"/>
+                </a:solidFill>
+                <a:hlinkClick r:id="rId2"/>
+              </a:rPr>
+              <a:t>github.com/brry/rdwd</a:t>
+            </a:r>
+            <a:r>
+              <a:rPr lang="de-DE" sz="1400" smtClean="0">
+                <a:solidFill>
+                  <a:schemeClr val="tx1"/>
+                </a:solidFill>
+              </a:rPr>
+              <a:t> </a:t>
+            </a:r>
+            <a:endParaRPr lang="de-DE" sz="1400">
               <a:solidFill>
-                <a:schemeClr val="accent2"/>
+                <a:schemeClr val="tx1"/>
               </a:solidFill>
             </a:endParaRPr>
           </a:p>
@@ -3238,7 +3271,7 @@
         </p:nvSpPr>
         <p:spPr>
           <a:xfrm>
-            <a:off x="6531444" y="1549684"/>
+            <a:off x="4695690" y="4023677"/>
             <a:ext cx="1980000" cy="396000"/>
           </a:xfrm>
           <a:prstGeom prst="roundRect">
@@ -3277,14 +3310,14 @@
             <a:r>
               <a:rPr lang="de-DE" sz="3200" smtClean="0">
                 <a:solidFill>
-                  <a:schemeClr val="accent2"/>
+                  <a:schemeClr val="accent5"/>
                 </a:solidFill>
               </a:rPr>
               <a:t>dataDWD</a:t>
             </a:r>
             <a:endParaRPr lang="de-DE" sz="3200">
               <a:solidFill>
-                <a:schemeClr val="accent2"/>
+                <a:schemeClr val="accent5"/>
               </a:solidFill>
             </a:endParaRPr>
           </a:p>
@@ -3298,8 +3331,8 @@
         </p:nvSpPr>
         <p:spPr>
           <a:xfrm>
-            <a:off x="2706312" y="280904"/>
-            <a:ext cx="1980000" cy="396000"/>
+            <a:off x="2583156" y="2566839"/>
+            <a:ext cx="1870548" cy="396000"/>
           </a:xfrm>
           <a:prstGeom prst="roundRect">
             <a:avLst/>
@@ -3358,8 +3391,8 @@
         </p:nvSpPr>
         <p:spPr>
           <a:xfrm>
-            <a:off x="2706312" y="1549684"/>
-            <a:ext cx="1980000" cy="396000"/>
+            <a:off x="2583156" y="3195065"/>
+            <a:ext cx="1870548" cy="396000"/>
           </a:xfrm>
           <a:prstGeom prst="roundRect">
             <a:avLst/>
@@ -3421,8 +3454,8 @@
         </p:nvCxnSpPr>
         <p:spPr>
           <a:xfrm>
-            <a:off x="2256312" y="1113294"/>
-            <a:ext cx="450000" cy="634390"/>
+            <a:off x="2335516" y="3387795"/>
+            <a:ext cx="247640" cy="5270"/>
           </a:xfrm>
           <a:prstGeom prst="straightConnector1">
             <a:avLst/>
@@ -3457,8 +3490,8 @@
         </p:nvCxnSpPr>
         <p:spPr>
           <a:xfrm flipV="1">
-            <a:off x="2256312" y="478904"/>
-            <a:ext cx="450000" cy="634390"/>
+            <a:off x="2335516" y="2764839"/>
+            <a:ext cx="247640" cy="622956"/>
           </a:xfrm>
           <a:prstGeom prst="straightConnector1">
             <a:avLst/>
@@ -3482,41 +3515,6 @@
           </a:fontRef>
         </p:style>
       </p:cxnSp>
-      <p:cxnSp>
-        <p:nvCxnSpPr>
-          <p:cNvPr id="27" name="Gerade Verbindung mit Pfeil 26"/>
-          <p:cNvCxnSpPr>
-            <a:stCxn id="13" idx="3"/>
-          </p:cNvCxnSpPr>
-          <p:nvPr/>
-        </p:nvCxnSpPr>
-        <p:spPr>
-          <a:xfrm flipV="1">
-            <a:off x="2256313" y="4837465"/>
-            <a:ext cx="369164" cy="230831"/>
-          </a:xfrm>
-          <a:prstGeom prst="straightConnector1">
-            <a:avLst/>
-          </a:prstGeom>
-          <a:ln>
-            <a:tailEnd type="triangle"/>
-          </a:ln>
-        </p:spPr>
-        <p:style>
-          <a:lnRef idx="1">
-            <a:schemeClr val="accent2"/>
-          </a:lnRef>
-          <a:fillRef idx="0">
-            <a:schemeClr val="accent2"/>
-          </a:fillRef>
-          <a:effectRef idx="0">
-            <a:schemeClr val="accent2"/>
-          </a:effectRef>
-          <a:fontRef idx="minor">
-            <a:schemeClr val="tx1"/>
-          </a:fontRef>
-        </p:style>
-      </p:cxnSp>
       <p:sp>
         <p:nvSpPr>
           <p:cNvPr id="28" name="Abgerundetes Rechteck 27"/>
@@ -3525,7 +3523,7 @@
         </p:nvSpPr>
         <p:spPr>
           <a:xfrm>
-            <a:off x="4295492" y="915294"/>
+            <a:off x="4701344" y="2878317"/>
             <a:ext cx="1980000" cy="396000"/>
           </a:xfrm>
           <a:prstGeom prst="roundRect">
@@ -3564,14 +3562,14 @@
             <a:r>
               <a:rPr lang="de-DE" sz="3200" smtClean="0">
                 <a:solidFill>
-                  <a:schemeClr val="accent2"/>
+                  <a:schemeClr val="accent5"/>
                 </a:solidFill>
               </a:rPr>
               <a:t>selectDWD</a:t>
             </a:r>
             <a:endParaRPr lang="de-DE" sz="3200">
               <a:solidFill>
-                <a:schemeClr val="accent2"/>
+                <a:schemeClr val="accent5"/>
               </a:solidFill>
             </a:endParaRPr>
           </a:p>
@@ -3588,8 +3586,8 @@
         </p:nvCxnSpPr>
         <p:spPr>
           <a:xfrm>
-            <a:off x="1213815" y="676904"/>
-            <a:ext cx="0" cy="238390"/>
+            <a:off x="1293018" y="2962839"/>
+            <a:ext cx="1" cy="226956"/>
           </a:xfrm>
           <a:prstGeom prst="straightConnector1">
             <a:avLst/>
@@ -3617,15 +3615,15 @@
         <p:nvCxnSpPr>
           <p:cNvPr id="41" name="Gerade Verbindung mit Pfeil 40"/>
           <p:cNvCxnSpPr>
-            <a:stCxn id="25" idx="0"/>
+            <a:stCxn id="25" idx="3"/>
             <a:endCxn id="28" idx="1"/>
           </p:cNvCxnSpPr>
           <p:nvPr/>
         </p:nvCxnSpPr>
         <p:spPr>
           <a:xfrm flipV="1">
-            <a:off x="3696312" y="1113294"/>
-            <a:ext cx="599180" cy="436390"/>
+            <a:off x="4453704" y="3076317"/>
+            <a:ext cx="247640" cy="316748"/>
           </a:xfrm>
           <a:prstGeom prst="straightConnector1">
             <a:avLst/>
@@ -3653,15 +3651,15 @@
         <p:nvCxnSpPr>
           <p:cNvPr id="44" name="Gerade Verbindung mit Pfeil 43"/>
           <p:cNvCxnSpPr>
-            <a:stCxn id="24" idx="2"/>
+            <a:stCxn id="24" idx="3"/>
             <a:endCxn id="28" idx="1"/>
           </p:cNvCxnSpPr>
           <p:nvPr/>
         </p:nvCxnSpPr>
         <p:spPr>
           <a:xfrm>
-            <a:off x="3696312" y="676904"/>
-            <a:ext cx="599180" cy="436390"/>
+            <a:off x="4453704" y="2764839"/>
+            <a:ext cx="247640" cy="311478"/>
           </a:xfrm>
           <a:prstGeom prst="straightConnector1">
             <a:avLst/>
@@ -3689,15 +3687,678 @@
         <p:nvCxnSpPr>
           <p:cNvPr id="47" name="Gerade Verbindung mit Pfeil 46"/>
           <p:cNvCxnSpPr>
-            <a:stCxn id="74" idx="2"/>
+            <a:stCxn id="14" idx="2"/>
             <a:endCxn id="12" idx="0"/>
           </p:cNvCxnSpPr>
           <p:nvPr/>
         </p:nvCxnSpPr>
         <p:spPr>
           <a:xfrm>
-            <a:off x="7521444" y="3721916"/>
-            <a:ext cx="0" cy="377787"/>
+            <a:off x="5685690" y="4419677"/>
+            <a:ext cx="5654" cy="186057"/>
+          </a:xfrm>
+          <a:prstGeom prst="straightConnector1">
+            <a:avLst/>
+          </a:prstGeom>
+          <a:ln>
+            <a:tailEnd type="triangle"/>
+          </a:ln>
+        </p:spPr>
+        <p:style>
+          <a:lnRef idx="1">
+            <a:schemeClr val="accent2"/>
+          </a:lnRef>
+          <a:fillRef idx="0">
+            <a:schemeClr val="accent2"/>
+          </a:fillRef>
+          <a:effectRef idx="0">
+            <a:schemeClr val="accent2"/>
+          </a:effectRef>
+          <a:fontRef idx="minor">
+            <a:schemeClr val="tx1"/>
+          </a:fontRef>
+        </p:style>
+      </p:cxnSp>
+      <p:sp>
+        <p:nvSpPr>
+          <p:cNvPr id="58" name="Rechteck 57"/>
+          <p:cNvSpPr/>
+          <p:nvPr/>
+        </p:nvSpPr>
+        <p:spPr>
+          <a:xfrm>
+            <a:off x="4907779" y="599302"/>
+            <a:ext cx="1555823" cy="1754326"/>
+          </a:xfrm>
+          <a:prstGeom prst="rect">
+            <a:avLst/>
+          </a:prstGeom>
+          <a:ln>
+            <a:solidFill>
+              <a:schemeClr val="accent1">
+                <a:lumMod val="40000"/>
+                <a:lumOff val="60000"/>
+              </a:schemeClr>
+            </a:solidFill>
+          </a:ln>
+        </p:spPr>
+        <p:txBody>
+          <a:bodyPr wrap="square">
+            <a:spAutoFit/>
+          </a:bodyPr>
+          <a:lstStyle/>
+          <a:p>
+            <a:r>
+              <a:rPr lang="de-DE" b="1"/>
+              <a:t>i</a:t>
+            </a:r>
+            <a:r>
+              <a:rPr lang="de-DE" b="1" smtClean="0"/>
+              <a:t>d</a:t>
+            </a:r>
+            <a:r>
+              <a:rPr lang="de-DE" smtClean="0"/>
+              <a:t> / name,</a:t>
+            </a:r>
+            <a:endParaRPr lang="de-DE"/>
+          </a:p>
+          <a:p>
+            <a:r>
+              <a:rPr lang="de-DE" smtClean="0"/>
+              <a:t>base,</a:t>
+            </a:r>
+            <a:endParaRPr lang="de-DE"/>
+          </a:p>
+          <a:p>
+            <a:r>
+              <a:rPr lang="de-DE" b="1"/>
+              <a:t>res, var, </a:t>
+            </a:r>
+            <a:r>
+              <a:rPr lang="de-DE" b="1" smtClean="0"/>
+              <a:t>per</a:t>
+            </a:r>
+            <a:r>
+              <a:rPr lang="de-DE" smtClean="0"/>
+              <a:t>,</a:t>
+            </a:r>
+            <a:endParaRPr lang="de-DE"/>
+          </a:p>
+          <a:p>
+            <a:r>
+              <a:rPr lang="de-DE" smtClean="0"/>
+              <a:t>findex,</a:t>
+            </a:r>
+          </a:p>
+          <a:p>
+            <a:r>
+              <a:rPr lang="de-DE"/>
+              <a:t>c</a:t>
+            </a:r>
+            <a:r>
+              <a:rPr lang="de-DE" smtClean="0"/>
+              <a:t>urrent,</a:t>
+            </a:r>
+          </a:p>
+          <a:p>
+            <a:r>
+              <a:rPr lang="de-DE" b="1" smtClean="0"/>
+              <a:t>meta?</a:t>
+            </a:r>
+            <a:endParaRPr lang="de-DE" b="1"/>
+          </a:p>
+        </p:txBody>
+      </p:sp>
+      <p:cxnSp>
+        <p:nvCxnSpPr>
+          <p:cNvPr id="60" name="Gerade Verbindung mit Pfeil 59"/>
+          <p:cNvCxnSpPr>
+            <a:stCxn id="58" idx="2"/>
+            <a:endCxn id="28" idx="0"/>
+          </p:cNvCxnSpPr>
+          <p:nvPr/>
+        </p:nvCxnSpPr>
+        <p:spPr>
+          <a:xfrm>
+            <a:off x="5685691" y="2353628"/>
+            <a:ext cx="5653" cy="524689"/>
+          </a:xfrm>
+          <a:prstGeom prst="straightConnector1">
+            <a:avLst/>
+          </a:prstGeom>
+          <a:ln>
+            <a:tailEnd type="triangle"/>
+          </a:ln>
+        </p:spPr>
+        <p:style>
+          <a:lnRef idx="1">
+            <a:schemeClr val="accent1"/>
+          </a:lnRef>
+          <a:fillRef idx="0">
+            <a:schemeClr val="accent1"/>
+          </a:fillRef>
+          <a:effectRef idx="0">
+            <a:schemeClr val="accent1"/>
+          </a:effectRef>
+          <a:fontRef idx="minor">
+            <a:schemeClr val="tx1"/>
+          </a:fontRef>
+        </p:style>
+      </p:cxnSp>
+      <p:sp>
+        <p:nvSpPr>
+          <p:cNvPr id="63" name="Rechteck 62"/>
+          <p:cNvSpPr/>
+          <p:nvPr/>
+        </p:nvSpPr>
+        <p:spPr>
+          <a:xfrm>
+            <a:off x="5685689" y="3465926"/>
+            <a:ext cx="1261884" cy="369332"/>
+          </a:xfrm>
+          <a:prstGeom prst="rect">
+            <a:avLst/>
+          </a:prstGeom>
+          <a:ln>
+            <a:solidFill>
+              <a:schemeClr val="accent1">
+                <a:lumMod val="40000"/>
+                <a:lumOff val="60000"/>
+              </a:schemeClr>
+            </a:solidFill>
+          </a:ln>
+        </p:spPr>
+        <p:txBody>
+          <a:bodyPr wrap="none">
+            <a:spAutoFit/>
+          </a:bodyPr>
+          <a:lstStyle/>
+          <a:p>
+            <a:r>
+              <a:rPr lang="de-DE" b="1"/>
+              <a:t>filename(s)</a:t>
+            </a:r>
+          </a:p>
+        </p:txBody>
+      </p:sp>
+      <p:cxnSp>
+        <p:nvCxnSpPr>
+          <p:cNvPr id="71" name="Gerade Verbindung mit Pfeil 70"/>
+          <p:cNvCxnSpPr>
+            <a:stCxn id="28" idx="2"/>
+            <a:endCxn id="14" idx="0"/>
+          </p:cNvCxnSpPr>
+          <p:nvPr/>
+        </p:nvCxnSpPr>
+        <p:spPr>
+          <a:xfrm flipH="1">
+            <a:off x="5685690" y="3274317"/>
+            <a:ext cx="5654" cy="749360"/>
+          </a:xfrm>
+          <a:prstGeom prst="straightConnector1">
+            <a:avLst/>
+          </a:prstGeom>
+          <a:ln>
+            <a:tailEnd type="triangle"/>
+          </a:ln>
+        </p:spPr>
+        <p:style>
+          <a:lnRef idx="1">
+            <a:schemeClr val="accent1"/>
+          </a:lnRef>
+          <a:fillRef idx="0">
+            <a:schemeClr val="accent1"/>
+          </a:fillRef>
+          <a:effectRef idx="0">
+            <a:schemeClr val="accent1"/>
+          </a:effectRef>
+          <a:fontRef idx="minor">
+            <a:schemeClr val="tx1"/>
+          </a:fontRef>
+        </p:style>
+      </p:cxnSp>
+      <p:sp>
+        <p:nvSpPr>
+          <p:cNvPr id="74" name="Rechteck 73"/>
+          <p:cNvSpPr/>
+          <p:nvPr/>
+        </p:nvSpPr>
+        <p:spPr>
+          <a:xfrm>
+            <a:off x="6947573" y="3048832"/>
+            <a:ext cx="1829166" cy="1200329"/>
+          </a:xfrm>
+          <a:prstGeom prst="rect">
+            <a:avLst/>
+          </a:prstGeom>
+          <a:ln>
+            <a:solidFill>
+              <a:schemeClr val="accent1">
+                <a:lumMod val="40000"/>
+                <a:lumOff val="60000"/>
+              </a:schemeClr>
+            </a:solidFill>
+          </a:ln>
+        </p:spPr>
+        <p:txBody>
+          <a:bodyPr wrap="square">
+            <a:spAutoFit/>
+          </a:bodyPr>
+          <a:lstStyle/>
+          <a:p>
+            <a:r>
+              <a:rPr lang="de-DE"/>
+              <a:t>dir, </a:t>
+            </a:r>
+            <a:r>
+              <a:rPr lang="de-DE" smtClean="0"/>
+              <a:t>force</a:t>
+            </a:r>
+            <a:r>
+              <a:rPr lang="de-DE" smtClean="0"/>
+              <a:t>?,</a:t>
+            </a:r>
+          </a:p>
+          <a:p>
+            <a:r>
+              <a:rPr lang="de-DE" smtClean="0"/>
+              <a:t>sleep</a:t>
+            </a:r>
+            <a:r>
+              <a:rPr lang="de-DE" smtClean="0"/>
+              <a:t>, quiet?,</a:t>
+            </a:r>
+            <a:endParaRPr lang="de-DE"/>
+          </a:p>
+          <a:p>
+            <a:r>
+              <a:rPr lang="de-DE"/>
+              <a:t>progbar</a:t>
+            </a:r>
+            <a:r>
+              <a:rPr lang="de-DE" smtClean="0"/>
+              <a:t>?, ntrunc, browse?, read?</a:t>
+            </a:r>
+            <a:endParaRPr lang="de-DE"/>
+          </a:p>
+        </p:txBody>
+      </p:sp>
+      <p:sp>
+        <p:nvSpPr>
+          <p:cNvPr id="45" name="Abgerundetes Rechteck 44"/>
+          <p:cNvSpPr/>
+          <p:nvPr/>
+        </p:nvSpPr>
+        <p:spPr>
+          <a:xfrm>
+            <a:off x="2583157" y="3819813"/>
+            <a:ext cx="1870548" cy="396000"/>
+          </a:xfrm>
+          <a:prstGeom prst="roundRect">
+            <a:avLst/>
+          </a:prstGeom>
+          <a:solidFill>
+            <a:schemeClr val="bg2">
+              <a:alpha val="91000"/>
+            </a:schemeClr>
+          </a:solidFill>
+          <a:ln>
+            <a:noFill/>
+          </a:ln>
+        </p:spPr>
+        <p:style>
+          <a:lnRef idx="2">
+            <a:schemeClr val="accent1">
+              <a:shade val="50000"/>
+            </a:schemeClr>
+          </a:lnRef>
+          <a:fillRef idx="1">
+            <a:schemeClr val="accent1"/>
+          </a:fillRef>
+          <a:effectRef idx="0">
+            <a:schemeClr val="accent1"/>
+          </a:effectRef>
+          <a:fontRef idx="minor">
+            <a:schemeClr val="lt1"/>
+          </a:fontRef>
+        </p:style>
+        <p:txBody>
+          <a:bodyPr lIns="36000" tIns="36000" rIns="36000" bIns="36000" rtlCol="0" anchor="ctr"/>
+          <a:lstStyle/>
+          <a:p>
+            <a:pPr algn="ctr"/>
+            <a:r>
+              <a:rPr lang="de-DE" sz="3200" smtClean="0">
+                <a:solidFill>
+                  <a:schemeClr val="accent2"/>
+                </a:solidFill>
+              </a:rPr>
+              <a:t>geoIndex</a:t>
+            </a:r>
+            <a:endParaRPr lang="de-DE" sz="3200">
+              <a:solidFill>
+                <a:schemeClr val="accent2"/>
+              </a:solidFill>
+            </a:endParaRPr>
+          </a:p>
+        </p:txBody>
+      </p:sp>
+      <p:sp>
+        <p:nvSpPr>
+          <p:cNvPr id="46" name="Abgerundetes Rechteck 45"/>
+          <p:cNvSpPr/>
+          <p:nvPr/>
+        </p:nvSpPr>
+        <p:spPr>
+          <a:xfrm>
+            <a:off x="3286284" y="587524"/>
+            <a:ext cx="1445269" cy="396000"/>
+          </a:xfrm>
+          <a:prstGeom prst="roundRect">
+            <a:avLst/>
+          </a:prstGeom>
+          <a:solidFill>
+            <a:schemeClr val="bg2">
+              <a:alpha val="91000"/>
+            </a:schemeClr>
+          </a:solidFill>
+          <a:ln>
+            <a:noFill/>
+          </a:ln>
+        </p:spPr>
+        <p:style>
+          <a:lnRef idx="2">
+            <a:schemeClr val="accent1">
+              <a:shade val="50000"/>
+            </a:schemeClr>
+          </a:lnRef>
+          <a:fillRef idx="1">
+            <a:schemeClr val="accent1"/>
+          </a:fillRef>
+          <a:effectRef idx="0">
+            <a:schemeClr val="accent1"/>
+          </a:effectRef>
+          <a:fontRef idx="minor">
+            <a:schemeClr val="lt1"/>
+          </a:fontRef>
+        </p:style>
+        <p:txBody>
+          <a:bodyPr lIns="36000" tIns="36000" rIns="36000" bIns="36000" rtlCol="0" anchor="ctr"/>
+          <a:lstStyle/>
+          <a:p>
+            <a:pPr algn="ctr"/>
+            <a:r>
+              <a:rPr lang="de-DE" sz="3200" smtClean="0">
+                <a:solidFill>
+                  <a:schemeClr val="accent2"/>
+                </a:solidFill>
+              </a:rPr>
+              <a:t>findID</a:t>
+            </a:r>
+            <a:endParaRPr lang="de-DE" sz="3200">
+              <a:solidFill>
+                <a:schemeClr val="accent2"/>
+              </a:solidFill>
+            </a:endParaRPr>
+          </a:p>
+        </p:txBody>
+      </p:sp>
+      <p:sp>
+        <p:nvSpPr>
+          <p:cNvPr id="56" name="Rechteck 55"/>
+          <p:cNvSpPr/>
+          <p:nvPr/>
+        </p:nvSpPr>
+        <p:spPr>
+          <a:xfrm>
+            <a:off x="3286284" y="1187688"/>
+            <a:ext cx="1445269" cy="923330"/>
+          </a:xfrm>
+          <a:prstGeom prst="rect">
+            <a:avLst/>
+          </a:prstGeom>
+          <a:ln>
+            <a:solidFill>
+              <a:schemeClr val="accent1">
+                <a:lumMod val="40000"/>
+                <a:lumOff val="60000"/>
+              </a:schemeClr>
+            </a:solidFill>
+          </a:ln>
+        </p:spPr>
+        <p:txBody>
+          <a:bodyPr wrap="square">
+            <a:spAutoFit/>
+          </a:bodyPr>
+          <a:lstStyle/>
+          <a:p>
+            <a:r>
+              <a:rPr lang="de-DE" b="1" smtClean="0"/>
+              <a:t>name</a:t>
+            </a:r>
+            <a:r>
+              <a:rPr lang="de-DE" smtClean="0"/>
+              <a:t>,</a:t>
+            </a:r>
+          </a:p>
+          <a:p>
+            <a:r>
+              <a:rPr lang="de-DE" smtClean="0"/>
+              <a:t>exactmatch?,</a:t>
+            </a:r>
+          </a:p>
+          <a:p>
+            <a:r>
+              <a:rPr lang="de-DE" smtClean="0"/>
+              <a:t>mindex</a:t>
+            </a:r>
+            <a:endParaRPr lang="de-DE"/>
+          </a:p>
+        </p:txBody>
+      </p:sp>
+      <p:cxnSp>
+        <p:nvCxnSpPr>
+          <p:cNvPr id="57" name="Gerade Verbindung mit Pfeil 56"/>
+          <p:cNvCxnSpPr>
+            <a:stCxn id="56" idx="0"/>
+            <a:endCxn id="46" idx="2"/>
+          </p:cNvCxnSpPr>
+          <p:nvPr/>
+        </p:nvCxnSpPr>
+        <p:spPr>
+          <a:xfrm flipV="1">
+            <a:off x="4008919" y="983524"/>
+            <a:ext cx="0" cy="204164"/>
+          </a:xfrm>
+          <a:prstGeom prst="straightConnector1">
+            <a:avLst/>
+          </a:prstGeom>
+          <a:ln>
+            <a:tailEnd type="triangle"/>
+          </a:ln>
+        </p:spPr>
+        <p:style>
+          <a:lnRef idx="1">
+            <a:schemeClr val="accent1"/>
+          </a:lnRef>
+          <a:fillRef idx="0">
+            <a:schemeClr val="accent1"/>
+          </a:fillRef>
+          <a:effectRef idx="0">
+            <a:schemeClr val="accent1"/>
+          </a:effectRef>
+          <a:fontRef idx="minor">
+            <a:schemeClr val="tx1"/>
+          </a:fontRef>
+        </p:style>
+      </p:cxnSp>
+      <p:sp>
+        <p:nvSpPr>
+          <p:cNvPr id="93" name="Rechteck 92"/>
+          <p:cNvSpPr/>
+          <p:nvPr/>
+        </p:nvSpPr>
+        <p:spPr>
+          <a:xfrm>
+            <a:off x="4731553" y="5009240"/>
+            <a:ext cx="1919581" cy="646331"/>
+          </a:xfrm>
+          <a:prstGeom prst="rect">
+            <a:avLst/>
+          </a:prstGeom>
+          <a:ln>
+            <a:solidFill>
+              <a:schemeClr val="accent1">
+                <a:lumMod val="40000"/>
+                <a:lumOff val="60000"/>
+              </a:schemeClr>
+            </a:solidFill>
+          </a:ln>
+        </p:spPr>
+        <p:txBody>
+          <a:bodyPr wrap="square">
+            <a:spAutoFit/>
+          </a:bodyPr>
+          <a:lstStyle/>
+          <a:p>
+            <a:r>
+              <a:rPr lang="de-DE" b="1" smtClean="0"/>
+              <a:t>file</a:t>
+            </a:r>
+            <a:r>
+              <a:rPr lang="de-DE" smtClean="0"/>
+              <a:t>, dir, </a:t>
+            </a:r>
+          </a:p>
+          <a:p>
+            <a:r>
+              <a:rPr lang="de-DE" smtClean="0"/>
+              <a:t>meta?, format, tz</a:t>
+            </a:r>
+            <a:endParaRPr lang="de-DE"/>
+          </a:p>
+        </p:txBody>
+      </p:sp>
+      <p:cxnSp>
+        <p:nvCxnSpPr>
+          <p:cNvPr id="31" name="Gerade Verbindung mit Pfeil 30"/>
+          <p:cNvCxnSpPr>
+            <a:stCxn id="16" idx="3"/>
+            <a:endCxn id="45" idx="1"/>
+          </p:cNvCxnSpPr>
+          <p:nvPr/>
+        </p:nvCxnSpPr>
+        <p:spPr>
+          <a:xfrm>
+            <a:off x="2335516" y="3387795"/>
+            <a:ext cx="247641" cy="630018"/>
+          </a:xfrm>
+          <a:prstGeom prst="straightConnector1">
+            <a:avLst/>
+          </a:prstGeom>
+          <a:ln>
+            <a:tailEnd type="triangle"/>
+          </a:ln>
+        </p:spPr>
+        <p:style>
+          <a:lnRef idx="1">
+            <a:schemeClr val="accent2"/>
+          </a:lnRef>
+          <a:fillRef idx="0">
+            <a:schemeClr val="accent2"/>
+          </a:fillRef>
+          <a:effectRef idx="0">
+            <a:schemeClr val="accent2"/>
+          </a:effectRef>
+          <a:fontRef idx="minor">
+            <a:schemeClr val="tx1"/>
+          </a:fontRef>
+        </p:style>
+      </p:cxnSp>
+      <p:sp>
+        <p:nvSpPr>
+          <p:cNvPr id="100" name="Abgerundetes Rechteck 99"/>
+          <p:cNvSpPr/>
+          <p:nvPr/>
+        </p:nvSpPr>
+        <p:spPr>
+          <a:xfrm>
+            <a:off x="6947573" y="1289059"/>
+            <a:ext cx="1829166" cy="1065205"/>
+          </a:xfrm>
+          <a:prstGeom prst="roundRect">
+            <a:avLst/>
+          </a:prstGeom>
+          <a:solidFill>
+            <a:schemeClr val="bg2">
+              <a:alpha val="91000"/>
+            </a:schemeClr>
+          </a:solidFill>
+          <a:ln>
+            <a:noFill/>
+          </a:ln>
+        </p:spPr>
+        <p:style>
+          <a:lnRef idx="2">
+            <a:schemeClr val="accent1">
+              <a:shade val="50000"/>
+            </a:schemeClr>
+          </a:lnRef>
+          <a:fillRef idx="1">
+            <a:schemeClr val="accent1"/>
+          </a:fillRef>
+          <a:effectRef idx="0">
+            <a:schemeClr val="accent1"/>
+          </a:effectRef>
+          <a:fontRef idx="minor">
+            <a:schemeClr val="lt1"/>
+          </a:fontRef>
+        </p:style>
+        <p:txBody>
+          <a:bodyPr lIns="36000" tIns="36000" rIns="36000" bIns="36000" rtlCol="0" anchor="ctr"/>
+          <a:lstStyle/>
+          <a:p>
+            <a:pPr algn="ctr"/>
+            <a:r>
+              <a:rPr lang="de-DE" sz="3200" smtClean="0">
+                <a:solidFill>
+                  <a:schemeClr val="accent2"/>
+                </a:solidFill>
+              </a:rPr>
+              <a:t>dirDWD</a:t>
+            </a:r>
+          </a:p>
+          <a:p>
+            <a:pPr algn="ctr"/>
+            <a:r>
+              <a:rPr lang="de-DE" sz="3200" smtClean="0">
+                <a:solidFill>
+                  <a:schemeClr val="accent2"/>
+                </a:solidFill>
+              </a:rPr>
+              <a:t>fileDWD</a:t>
+            </a:r>
+            <a:endParaRPr lang="de-DE" sz="3200">
+              <a:solidFill>
+                <a:schemeClr val="accent2"/>
+              </a:solidFill>
+            </a:endParaRPr>
+          </a:p>
+        </p:txBody>
+      </p:sp>
+      <p:cxnSp>
+        <p:nvCxnSpPr>
+          <p:cNvPr id="101" name="Gerade Verbindung mit Pfeil 100"/>
+          <p:cNvCxnSpPr>
+            <a:stCxn id="100" idx="2"/>
+            <a:endCxn id="74" idx="0"/>
+          </p:cNvCxnSpPr>
+          <p:nvPr/>
+        </p:nvCxnSpPr>
+        <p:spPr>
+          <a:xfrm>
+            <a:off x="7862156" y="2354264"/>
+            <a:ext cx="0" cy="694568"/>
           </a:xfrm>
           <a:prstGeom prst="straightConnector1">
             <a:avLst/>
@@ -3723,17 +4384,16 @@
       </p:cxnSp>
       <p:cxnSp>
         <p:nvCxnSpPr>
-          <p:cNvPr id="50" name="Gerade Verbindung mit Pfeil 49"/>
+          <p:cNvPr id="123" name="Gerade Verbindung mit Pfeil 122"/>
           <p:cNvCxnSpPr>
-            <a:stCxn id="28" idx="3"/>
-            <a:endCxn id="14" idx="0"/>
+            <a:stCxn id="46" idx="3"/>
           </p:cNvCxnSpPr>
           <p:nvPr/>
         </p:nvCxnSpPr>
         <p:spPr>
           <a:xfrm>
-            <a:off x="6275492" y="1113294"/>
-            <a:ext cx="1245952" cy="436390"/>
+            <a:off x="4731553" y="785524"/>
+            <a:ext cx="247640" cy="5051"/>
           </a:xfrm>
           <a:prstGeom prst="straightConnector1">
             <a:avLst/>
@@ -3757,635 +4417,6 @@
           </a:fontRef>
         </p:style>
       </p:cxnSp>
-      <p:cxnSp>
-        <p:nvCxnSpPr>
-          <p:cNvPr id="55" name="Gerade Verbindung mit Pfeil 54"/>
-          <p:cNvCxnSpPr>
-            <a:stCxn id="14" idx="1"/>
-            <a:endCxn id="25" idx="3"/>
-          </p:cNvCxnSpPr>
-          <p:nvPr/>
-        </p:nvCxnSpPr>
-        <p:spPr>
-          <a:xfrm flipH="1">
-            <a:off x="4686312" y="1747684"/>
-            <a:ext cx="1845132" cy="0"/>
-          </a:xfrm>
-          <a:prstGeom prst="straightConnector1">
-            <a:avLst/>
-          </a:prstGeom>
-          <a:ln>
-            <a:tailEnd type="triangle"/>
-          </a:ln>
-        </p:spPr>
-        <p:style>
-          <a:lnRef idx="1">
-            <a:schemeClr val="accent2"/>
-          </a:lnRef>
-          <a:fillRef idx="0">
-            <a:schemeClr val="accent2"/>
-          </a:fillRef>
-          <a:effectRef idx="0">
-            <a:schemeClr val="accent2"/>
-          </a:effectRef>
-          <a:fontRef idx="minor">
-            <a:schemeClr val="tx1"/>
-          </a:fontRef>
-        </p:style>
-      </p:cxnSp>
-      <p:sp>
-        <p:nvSpPr>
-          <p:cNvPr id="58" name="Rechteck 57"/>
-          <p:cNvSpPr/>
-          <p:nvPr/>
-        </p:nvSpPr>
-        <p:spPr>
-          <a:xfrm>
-            <a:off x="4526435" y="2425991"/>
-            <a:ext cx="1555823" cy="1754326"/>
-          </a:xfrm>
-          <a:prstGeom prst="rect">
-            <a:avLst/>
-          </a:prstGeom>
-          <a:ln>
-            <a:solidFill>
-              <a:schemeClr val="accent1">
-                <a:lumMod val="40000"/>
-                <a:lumOff val="60000"/>
-              </a:schemeClr>
-            </a:solidFill>
-          </a:ln>
-        </p:spPr>
-        <p:txBody>
-          <a:bodyPr wrap="square">
-            <a:spAutoFit/>
-          </a:bodyPr>
-          <a:lstStyle/>
-          <a:p>
-            <a:r>
-              <a:rPr lang="de-DE" b="1"/>
-              <a:t>i</a:t>
-            </a:r>
-            <a:r>
-              <a:rPr lang="de-DE" b="1" smtClean="0"/>
-              <a:t>d</a:t>
-            </a:r>
-            <a:r>
-              <a:rPr lang="de-DE" smtClean="0"/>
-              <a:t> / name,</a:t>
-            </a:r>
-            <a:endParaRPr lang="de-DE"/>
-          </a:p>
-          <a:p>
-            <a:r>
-              <a:rPr lang="de-DE" smtClean="0"/>
-              <a:t>base,</a:t>
-            </a:r>
-            <a:endParaRPr lang="de-DE"/>
-          </a:p>
-          <a:p>
-            <a:r>
-              <a:rPr lang="de-DE" b="1"/>
-              <a:t>res, var, </a:t>
-            </a:r>
-            <a:r>
-              <a:rPr lang="de-DE" b="1" smtClean="0"/>
-              <a:t>time</a:t>
-            </a:r>
-            <a:r>
-              <a:rPr lang="de-DE" smtClean="0"/>
-              <a:t>,</a:t>
-            </a:r>
-            <a:endParaRPr lang="de-DE"/>
-          </a:p>
-          <a:p>
-            <a:r>
-              <a:rPr lang="de-DE" smtClean="0"/>
-              <a:t>findex,</a:t>
-            </a:r>
-          </a:p>
-          <a:p>
-            <a:r>
-              <a:rPr lang="de-DE"/>
-              <a:t>c</a:t>
-            </a:r>
-            <a:r>
-              <a:rPr lang="de-DE" smtClean="0"/>
-              <a:t>urrent,</a:t>
-            </a:r>
-            <a:endParaRPr lang="de-DE" smtClean="0"/>
-          </a:p>
-          <a:p>
-            <a:r>
-              <a:rPr lang="de-DE" b="1" smtClean="0"/>
-              <a:t>meta?</a:t>
-            </a:r>
-            <a:endParaRPr lang="de-DE" b="1"/>
-          </a:p>
-        </p:txBody>
-      </p:sp>
-      <p:cxnSp>
-        <p:nvCxnSpPr>
-          <p:cNvPr id="60" name="Gerade Verbindung mit Pfeil 59"/>
-          <p:cNvCxnSpPr>
-            <a:stCxn id="58" idx="0"/>
-            <a:endCxn id="28" idx="2"/>
-          </p:cNvCxnSpPr>
-          <p:nvPr/>
-        </p:nvCxnSpPr>
-        <p:spPr>
-          <a:xfrm flipH="1" flipV="1">
-            <a:off x="5285492" y="1311294"/>
-            <a:ext cx="18855" cy="1114697"/>
-          </a:xfrm>
-          <a:prstGeom prst="straightConnector1">
-            <a:avLst/>
-          </a:prstGeom>
-          <a:ln>
-            <a:tailEnd type="triangle"/>
-          </a:ln>
-        </p:spPr>
-        <p:style>
-          <a:lnRef idx="1">
-            <a:schemeClr val="accent1"/>
-          </a:lnRef>
-          <a:fillRef idx="0">
-            <a:schemeClr val="accent1"/>
-          </a:fillRef>
-          <a:effectRef idx="0">
-            <a:schemeClr val="accent1"/>
-          </a:effectRef>
-          <a:fontRef idx="minor">
-            <a:schemeClr val="tx1"/>
-          </a:fontRef>
-        </p:style>
-      </p:cxnSp>
-      <p:sp>
-        <p:nvSpPr>
-          <p:cNvPr id="63" name="Rechteck 62"/>
-          <p:cNvSpPr/>
-          <p:nvPr/>
-        </p:nvSpPr>
-        <p:spPr>
-          <a:xfrm>
-            <a:off x="6901723" y="2425991"/>
-            <a:ext cx="1261884" cy="369332"/>
-          </a:xfrm>
-          <a:prstGeom prst="rect">
-            <a:avLst/>
-          </a:prstGeom>
-          <a:ln>
-            <a:solidFill>
-              <a:schemeClr val="accent1">
-                <a:lumMod val="40000"/>
-                <a:lumOff val="60000"/>
-              </a:schemeClr>
-            </a:solidFill>
-          </a:ln>
-        </p:spPr>
-        <p:txBody>
-          <a:bodyPr wrap="none">
-            <a:spAutoFit/>
-          </a:bodyPr>
-          <a:lstStyle/>
-          <a:p>
-            <a:r>
-              <a:rPr lang="de-DE" b="1"/>
-              <a:t>filename(s)</a:t>
-            </a:r>
-          </a:p>
-        </p:txBody>
-      </p:sp>
-      <p:cxnSp>
-        <p:nvCxnSpPr>
-          <p:cNvPr id="64" name="Gerade Verbindung mit Pfeil 63"/>
-          <p:cNvCxnSpPr>
-            <a:endCxn id="63" idx="1"/>
-          </p:cNvCxnSpPr>
-          <p:nvPr/>
-        </p:nvCxnSpPr>
-        <p:spPr>
-          <a:xfrm>
-            <a:off x="6082258" y="2610657"/>
-            <a:ext cx="819465" cy="0"/>
-          </a:xfrm>
-          <a:prstGeom prst="straightConnector1">
-            <a:avLst/>
-          </a:prstGeom>
-          <a:ln>
-            <a:tailEnd type="triangle"/>
-          </a:ln>
-        </p:spPr>
-        <p:style>
-          <a:lnRef idx="1">
-            <a:schemeClr val="accent1"/>
-          </a:lnRef>
-          <a:fillRef idx="0">
-            <a:schemeClr val="accent1"/>
-          </a:fillRef>
-          <a:effectRef idx="0">
-            <a:schemeClr val="accent1"/>
-          </a:effectRef>
-          <a:fontRef idx="minor">
-            <a:schemeClr val="tx1"/>
-          </a:fontRef>
-        </p:style>
-      </p:cxnSp>
-      <p:cxnSp>
-        <p:nvCxnSpPr>
-          <p:cNvPr id="71" name="Gerade Verbindung mit Pfeil 70"/>
-          <p:cNvCxnSpPr>
-            <a:stCxn id="63" idx="0"/>
-            <a:endCxn id="14" idx="2"/>
-          </p:cNvCxnSpPr>
-          <p:nvPr/>
-        </p:nvCxnSpPr>
-        <p:spPr>
-          <a:xfrm flipH="1" flipV="1">
-            <a:off x="7521444" y="1945684"/>
-            <a:ext cx="11221" cy="480307"/>
-          </a:xfrm>
-          <a:prstGeom prst="straightConnector1">
-            <a:avLst/>
-          </a:prstGeom>
-          <a:ln>
-            <a:tailEnd type="triangle"/>
-          </a:ln>
-        </p:spPr>
-        <p:style>
-          <a:lnRef idx="1">
-            <a:schemeClr val="accent1"/>
-          </a:lnRef>
-          <a:fillRef idx="0">
-            <a:schemeClr val="accent1"/>
-          </a:fillRef>
-          <a:effectRef idx="0">
-            <a:schemeClr val="accent1"/>
-          </a:effectRef>
-          <a:fontRef idx="minor">
-            <a:schemeClr val="tx1"/>
-          </a:fontRef>
-        </p:style>
-      </p:cxnSp>
-      <p:sp>
-        <p:nvSpPr>
-          <p:cNvPr id="74" name="Rechteck 73"/>
-          <p:cNvSpPr/>
-          <p:nvPr/>
-        </p:nvSpPr>
-        <p:spPr>
-          <a:xfrm>
-            <a:off x="6221584" y="2798586"/>
-            <a:ext cx="2599720" cy="923330"/>
-          </a:xfrm>
-          <a:prstGeom prst="rect">
-            <a:avLst/>
-          </a:prstGeom>
-          <a:ln>
-            <a:solidFill>
-              <a:schemeClr val="accent1">
-                <a:lumMod val="40000"/>
-                <a:lumOff val="60000"/>
-              </a:schemeClr>
-            </a:solidFill>
-          </a:ln>
-        </p:spPr>
-        <p:txBody>
-          <a:bodyPr wrap="square">
-            <a:spAutoFit/>
-          </a:bodyPr>
-          <a:lstStyle/>
-          <a:p>
-            <a:r>
-              <a:rPr lang="de-DE"/>
-              <a:t>dir, </a:t>
-            </a:r>
-            <a:r>
-              <a:rPr lang="de-DE" smtClean="0"/>
-              <a:t>force?, sleep, quiet</a:t>
-            </a:r>
-            <a:r>
-              <a:rPr lang="de-DE" smtClean="0"/>
-              <a:t>?,</a:t>
-            </a:r>
-            <a:endParaRPr lang="de-DE"/>
-          </a:p>
-          <a:p>
-            <a:r>
-              <a:rPr lang="de-DE"/>
-              <a:t>progbar</a:t>
-            </a:r>
-            <a:r>
-              <a:rPr lang="de-DE" smtClean="0"/>
-              <a:t>?, ntrunc, </a:t>
-            </a:r>
-            <a:r>
-              <a:rPr lang="de-DE" smtClean="0"/>
-              <a:t>browse?, read?</a:t>
-            </a:r>
-            <a:endParaRPr lang="de-DE"/>
-          </a:p>
-        </p:txBody>
-      </p:sp>
-      <p:sp>
-        <p:nvSpPr>
-          <p:cNvPr id="45" name="Abgerundetes Rechteck 44"/>
-          <p:cNvSpPr/>
-          <p:nvPr/>
-        </p:nvSpPr>
-        <p:spPr>
-          <a:xfrm>
-            <a:off x="171318" y="2136086"/>
-            <a:ext cx="2084995" cy="396000"/>
-          </a:xfrm>
-          <a:prstGeom prst="roundRect">
-            <a:avLst/>
-          </a:prstGeom>
-          <a:solidFill>
-            <a:schemeClr val="bg2">
-              <a:alpha val="91000"/>
-            </a:schemeClr>
-          </a:solidFill>
-          <a:ln>
-            <a:noFill/>
-          </a:ln>
-        </p:spPr>
-        <p:style>
-          <a:lnRef idx="2">
-            <a:schemeClr val="accent1">
-              <a:shade val="50000"/>
-            </a:schemeClr>
-          </a:lnRef>
-          <a:fillRef idx="1">
-            <a:schemeClr val="accent1"/>
-          </a:fillRef>
-          <a:effectRef idx="0">
-            <a:schemeClr val="accent1"/>
-          </a:effectRef>
-          <a:fontRef idx="minor">
-            <a:schemeClr val="lt1"/>
-          </a:fontRef>
-        </p:style>
-        <p:txBody>
-          <a:bodyPr lIns="36000" tIns="36000" rIns="36000" bIns="36000" rtlCol="0" anchor="ctr"/>
-          <a:lstStyle/>
-          <a:p>
-            <a:pPr algn="ctr"/>
-            <a:r>
-              <a:rPr lang="de-DE" sz="3200" err="1" smtClean="0">
-                <a:solidFill>
-                  <a:schemeClr val="accent2"/>
-                </a:solidFill>
-              </a:rPr>
-              <a:t>viewI</a:t>
-            </a:r>
-            <a:r>
-              <a:rPr lang="de-DE" sz="3200" err="1" smtClean="0">
-                <a:solidFill>
-                  <a:schemeClr val="accent2"/>
-                </a:solidFill>
-              </a:rPr>
-              <a:t>ndex</a:t>
-            </a:r>
-            <a:endParaRPr lang="de-DE" sz="3200">
-              <a:solidFill>
-                <a:schemeClr val="accent2"/>
-              </a:solidFill>
-            </a:endParaRPr>
-          </a:p>
-        </p:txBody>
-      </p:sp>
-      <p:sp>
-        <p:nvSpPr>
-          <p:cNvPr id="46" name="Abgerundetes Rechteck 45"/>
-          <p:cNvSpPr/>
-          <p:nvPr/>
-        </p:nvSpPr>
-        <p:spPr>
-          <a:xfrm>
-            <a:off x="2678771" y="2425991"/>
-            <a:ext cx="1445269" cy="396000"/>
-          </a:xfrm>
-          <a:prstGeom prst="roundRect">
-            <a:avLst/>
-          </a:prstGeom>
-          <a:solidFill>
-            <a:schemeClr val="bg2">
-              <a:alpha val="91000"/>
-            </a:schemeClr>
-          </a:solidFill>
-          <a:ln>
-            <a:noFill/>
-          </a:ln>
-        </p:spPr>
-        <p:style>
-          <a:lnRef idx="2">
-            <a:schemeClr val="accent1">
-              <a:shade val="50000"/>
-            </a:schemeClr>
-          </a:lnRef>
-          <a:fillRef idx="1">
-            <a:schemeClr val="accent1"/>
-          </a:fillRef>
-          <a:effectRef idx="0">
-            <a:schemeClr val="accent1"/>
-          </a:effectRef>
-          <a:fontRef idx="minor">
-            <a:schemeClr val="lt1"/>
-          </a:fontRef>
-        </p:style>
-        <p:txBody>
-          <a:bodyPr lIns="36000" tIns="36000" rIns="36000" bIns="36000" rtlCol="0" anchor="ctr"/>
-          <a:lstStyle/>
-          <a:p>
-            <a:pPr algn="ctr"/>
-            <a:r>
-              <a:rPr lang="de-DE" sz="3200" smtClean="0">
-                <a:solidFill>
-                  <a:schemeClr val="accent2"/>
-                </a:solidFill>
-              </a:rPr>
-              <a:t>findID</a:t>
-            </a:r>
-            <a:endParaRPr lang="de-DE" sz="3200">
-              <a:solidFill>
-                <a:schemeClr val="accent2"/>
-              </a:solidFill>
-            </a:endParaRPr>
-          </a:p>
-        </p:txBody>
-      </p:sp>
-      <p:sp>
-        <p:nvSpPr>
-          <p:cNvPr id="56" name="Rechteck 55"/>
-          <p:cNvSpPr/>
-          <p:nvPr/>
-        </p:nvSpPr>
-        <p:spPr>
-          <a:xfrm>
-            <a:off x="2622473" y="3026155"/>
-            <a:ext cx="1557861" cy="923330"/>
-          </a:xfrm>
-          <a:prstGeom prst="rect">
-            <a:avLst/>
-          </a:prstGeom>
-          <a:ln>
-            <a:solidFill>
-              <a:schemeClr val="accent1">
-                <a:lumMod val="40000"/>
-                <a:lumOff val="60000"/>
-              </a:schemeClr>
-            </a:solidFill>
-          </a:ln>
-        </p:spPr>
-        <p:txBody>
-          <a:bodyPr wrap="square">
-            <a:spAutoFit/>
-          </a:bodyPr>
-          <a:lstStyle/>
-          <a:p>
-            <a:r>
-              <a:rPr lang="de-DE" b="1" smtClean="0"/>
-              <a:t>name</a:t>
-            </a:r>
-            <a:r>
-              <a:rPr lang="de-DE" smtClean="0"/>
-              <a:t>,</a:t>
-            </a:r>
-          </a:p>
-          <a:p>
-            <a:r>
-              <a:rPr lang="de-DE" smtClean="0"/>
-              <a:t>exactmatch?,</a:t>
-            </a:r>
-          </a:p>
-          <a:p>
-            <a:r>
-              <a:rPr lang="de-DE" smtClean="0"/>
-              <a:t>mindex</a:t>
-            </a:r>
-            <a:endParaRPr lang="de-DE"/>
-          </a:p>
-        </p:txBody>
-      </p:sp>
-      <p:cxnSp>
-        <p:nvCxnSpPr>
-          <p:cNvPr id="57" name="Gerade Verbindung mit Pfeil 56"/>
-          <p:cNvCxnSpPr>
-            <a:stCxn id="56" idx="0"/>
-            <a:endCxn id="46" idx="2"/>
-          </p:cNvCxnSpPr>
-          <p:nvPr/>
-        </p:nvCxnSpPr>
-        <p:spPr>
-          <a:xfrm flipV="1">
-            <a:off x="3401404" y="2821991"/>
-            <a:ext cx="2" cy="204164"/>
-          </a:xfrm>
-          <a:prstGeom prst="straightConnector1">
-            <a:avLst/>
-          </a:prstGeom>
-          <a:ln>
-            <a:tailEnd type="triangle"/>
-          </a:ln>
-        </p:spPr>
-        <p:style>
-          <a:lnRef idx="1">
-            <a:schemeClr val="accent1"/>
-          </a:lnRef>
-          <a:fillRef idx="0">
-            <a:schemeClr val="accent1"/>
-          </a:fillRef>
-          <a:effectRef idx="0">
-            <a:schemeClr val="accent1"/>
-          </a:effectRef>
-          <a:fontRef idx="minor">
-            <a:schemeClr val="tx1"/>
-          </a:fontRef>
-        </p:style>
-      </p:cxnSp>
-      <p:cxnSp>
-        <p:nvCxnSpPr>
-          <p:cNvPr id="61" name="Gerade Verbindung mit Pfeil 60"/>
-          <p:cNvCxnSpPr>
-            <a:stCxn id="46" idx="3"/>
-          </p:cNvCxnSpPr>
-          <p:nvPr/>
-        </p:nvCxnSpPr>
-        <p:spPr>
-          <a:xfrm>
-            <a:off x="4124040" y="2623991"/>
-            <a:ext cx="452820" cy="0"/>
-          </a:xfrm>
-          <a:prstGeom prst="straightConnector1">
-            <a:avLst/>
-          </a:prstGeom>
-          <a:ln>
-            <a:tailEnd type="triangle"/>
-          </a:ln>
-        </p:spPr>
-        <p:style>
-          <a:lnRef idx="1">
-            <a:schemeClr val="accent2"/>
-          </a:lnRef>
-          <a:fillRef idx="0">
-            <a:schemeClr val="accent2"/>
-          </a:fillRef>
-          <a:effectRef idx="0">
-            <a:schemeClr val="accent2"/>
-          </a:effectRef>
-          <a:fontRef idx="minor">
-            <a:schemeClr val="tx1"/>
-          </a:fontRef>
-        </p:style>
-      </p:cxnSp>
-      <p:sp>
-        <p:nvSpPr>
-          <p:cNvPr id="93" name="Rechteck 92"/>
-          <p:cNvSpPr/>
-          <p:nvPr/>
-        </p:nvSpPr>
-        <p:spPr>
-          <a:xfrm>
-            <a:off x="6561653" y="4503209"/>
-            <a:ext cx="1919581" cy="646331"/>
-          </a:xfrm>
-          <a:prstGeom prst="rect">
-            <a:avLst/>
-          </a:prstGeom>
-          <a:ln>
-            <a:solidFill>
-              <a:schemeClr val="accent1">
-                <a:lumMod val="40000"/>
-                <a:lumOff val="60000"/>
-              </a:schemeClr>
-            </a:solidFill>
-          </a:ln>
-        </p:spPr>
-        <p:txBody>
-          <a:bodyPr wrap="square">
-            <a:spAutoFit/>
-          </a:bodyPr>
-          <a:lstStyle/>
-          <a:p>
-            <a:r>
-              <a:rPr lang="de-DE" b="1" smtClean="0"/>
-              <a:t>file</a:t>
-            </a:r>
-            <a:r>
-              <a:rPr lang="de-DE" smtClean="0"/>
-              <a:t>, dir, </a:t>
-            </a:r>
-          </a:p>
-          <a:p>
-            <a:r>
-              <a:rPr lang="de-DE" smtClean="0"/>
-              <a:t>meta?, format, tz</a:t>
-            </a:r>
-            <a:endParaRPr lang="de-DE"/>
-          </a:p>
-        </p:txBody>
-      </p:sp>
     </p:spTree>
     <p:extLst>
       <p:ext uri="{BB962C8B-B14F-4D97-AF65-F5344CB8AC3E}">
@@ -4654,7 +4685,7 @@
   <a:extraClrSchemeLst/>
   <a:extLst>
     <a:ext uri="{05A4C25C-085E-4340-85A3-A5531E510DB2}">
-      <thm15:themeFamily xmlns:thm15="http://schemas.microsoft.com/office/thememl/2012/main" xmlns="" name="Office Theme" id="{62F939B6-93AF-4DB8-9C6B-D6C7DFDC589F}" vid="{4A3C46E8-61CC-4603-A589-7422A47A8E4A}"/>
+      <thm15:themeFamily xmlns:thm15="http://schemas.microsoft.com/office/thememl/2012/main" name="Office Theme" id="{62F939B6-93AF-4DB8-9C6B-D6C7DFDC589F}" vid="{4A3C46E8-61CC-4603-A589-7422A47A8E4A}"/>
     </a:ext>
   </a:extLst>
 </a:theme>

</xml_diff>

<commit_message>
package schematic updated + exported as pdf
</commit_message>
<xml_diff>
--- a/PackageSchematic.pptx
+++ b/PackageSchematic.pptx
@@ -2,12 +2,12 @@
 <file path=ppt/presentation.xml><?xml version="1.0" encoding="utf-8"?>
 <p:presentation xmlns:a="http://schemas.openxmlformats.org/drawingml/2006/main" xmlns:r="http://schemas.openxmlformats.org/officeDocument/2006/relationships" xmlns:p="http://schemas.openxmlformats.org/presentationml/2006/main" saveSubsetFonts="1">
   <p:sldMasterIdLst>
-    <p:sldMasterId id="2147483684" r:id="rId1"/>
+    <p:sldMasterId id="2147483696" r:id="rId1"/>
   </p:sldMasterIdLst>
   <p:sldIdLst>
     <p:sldId id="256" r:id="rId2"/>
   </p:sldIdLst>
-  <p:sldSz cx="9144000" cy="6119813"/>
+  <p:sldSz cx="9144000" cy="5580063"/>
   <p:notesSz cx="6858000" cy="9144000"/>
   <p:defaultTextStyle>
     <a:defPPr>
@@ -107,12 +107,12 @@
   <p:extLst>
     <p:ext uri="{EFAFB233-063F-42B5-8137-9DF3F51BA10A}">
       <p15:sldGuideLst xmlns:p15="http://schemas.microsoft.com/office/powerpoint/2012/main">
-        <p15:guide id="1" orient="horz" pos="1927">
+        <p15:guide id="1" orient="horz" pos="1757" userDrawn="1">
           <p15:clr>
             <a:srgbClr val="A4A3A4"/>
           </p15:clr>
         </p15:guide>
-        <p15:guide id="2" pos="2880">
+        <p15:guide id="2" pos="2880" userDrawn="1">
           <p15:clr>
             <a:srgbClr val="A4A3A4"/>
           </p15:clr>
@@ -152,15 +152,15 @@
         </p:nvSpPr>
         <p:spPr>
           <a:xfrm>
-            <a:off x="685800" y="1001553"/>
-            <a:ext cx="7772400" cy="2130602"/>
+            <a:off x="1143000" y="913219"/>
+            <a:ext cx="6858000" cy="1942689"/>
           </a:xfrm>
         </p:spPr>
         <p:txBody>
           <a:bodyPr anchor="b"/>
           <a:lstStyle>
             <a:lvl1pPr algn="ctr">
-              <a:defRPr sz="5354"/>
+              <a:defRPr sz="4500"/>
             </a:lvl1pPr>
           </a:lstStyle>
           <a:p>
@@ -184,8 +184,8 @@
         </p:nvSpPr>
         <p:spPr>
           <a:xfrm>
-            <a:off x="1143000" y="3214319"/>
-            <a:ext cx="6858000" cy="1477538"/>
+            <a:off x="1143000" y="2930825"/>
+            <a:ext cx="6858000" cy="1347223"/>
           </a:xfrm>
         </p:spPr>
         <p:txBody>
@@ -193,39 +193,39 @@
           <a:lstStyle>
             <a:lvl1pPr marL="0" indent="0" algn="ctr">
               <a:buNone/>
-              <a:defRPr sz="2142"/>
+              <a:defRPr sz="1800"/>
             </a:lvl1pPr>
-            <a:lvl2pPr marL="408005" indent="0" algn="ctr">
-              <a:buNone/>
-              <a:defRPr sz="1785"/>
+            <a:lvl2pPr marL="342900" indent="0" algn="ctr">
+              <a:buNone/>
+              <a:defRPr sz="1500"/>
             </a:lvl2pPr>
-            <a:lvl3pPr marL="816011" indent="0" algn="ctr">
-              <a:buNone/>
-              <a:defRPr sz="1606"/>
+            <a:lvl3pPr marL="685800" indent="0" algn="ctr">
+              <a:buNone/>
+              <a:defRPr sz="1350"/>
             </a:lvl3pPr>
-            <a:lvl4pPr marL="1224016" indent="0" algn="ctr">
-              <a:buNone/>
-              <a:defRPr sz="1428"/>
+            <a:lvl4pPr marL="1028700" indent="0" algn="ctr">
+              <a:buNone/>
+              <a:defRPr sz="1200"/>
             </a:lvl4pPr>
-            <a:lvl5pPr marL="1632021" indent="0" algn="ctr">
-              <a:buNone/>
-              <a:defRPr sz="1428"/>
+            <a:lvl5pPr marL="1371600" indent="0" algn="ctr">
+              <a:buNone/>
+              <a:defRPr sz="1200"/>
             </a:lvl5pPr>
-            <a:lvl6pPr marL="2040026" indent="0" algn="ctr">
-              <a:buNone/>
-              <a:defRPr sz="1428"/>
+            <a:lvl6pPr marL="1714500" indent="0" algn="ctr">
+              <a:buNone/>
+              <a:defRPr sz="1200"/>
             </a:lvl6pPr>
-            <a:lvl7pPr marL="2448032" indent="0" algn="ctr">
-              <a:buNone/>
-              <a:defRPr sz="1428"/>
+            <a:lvl7pPr marL="2057400" indent="0" algn="ctr">
+              <a:buNone/>
+              <a:defRPr sz="1200"/>
             </a:lvl7pPr>
-            <a:lvl8pPr marL="2856037" indent="0" algn="ctr">
-              <a:buNone/>
-              <a:defRPr sz="1428"/>
+            <a:lvl8pPr marL="2400300" indent="0" algn="ctr">
+              <a:buNone/>
+              <a:defRPr sz="1200"/>
             </a:lvl8pPr>
-            <a:lvl9pPr marL="3264042" indent="0" algn="ctr">
-              <a:buNone/>
-              <a:defRPr sz="1428"/>
+            <a:lvl9pPr marL="2743200" indent="0" algn="ctr">
+              <a:buNone/>
+              <a:defRPr sz="1200"/>
             </a:lvl9pPr>
           </a:lstStyle>
           <a:p>
@@ -254,7 +254,7 @@
           <a:p>
             <a:fld id="{300DB245-849F-4AAA-AD3E-676A6FA9CB3B}" type="datetimeFigureOut">
               <a:rPr lang="de-DE" smtClean="0"/>
-              <a:t>22.11.2016</a:t>
+              <a:t>20.01.2017</a:t>
             </a:fld>
             <a:endParaRPr lang="de-DE"/>
           </a:p>
@@ -305,7 +305,7 @@
     </p:spTree>
     <p:extLst>
       <p:ext uri="{BB962C8B-B14F-4D97-AF65-F5344CB8AC3E}">
-        <p14:creationId xmlns:p14="http://schemas.microsoft.com/office/powerpoint/2010/main" val="1837167042"/>
+        <p14:creationId xmlns:p14="http://schemas.microsoft.com/office/powerpoint/2010/main" val="1213689000"/>
       </p:ext>
     </p:extLst>
   </p:cSld>
@@ -424,7 +424,7 @@
           <a:p>
             <a:fld id="{300DB245-849F-4AAA-AD3E-676A6FA9CB3B}" type="datetimeFigureOut">
               <a:rPr lang="de-DE" smtClean="0"/>
-              <a:t>22.11.2016</a:t>
+              <a:t>20.01.2017</a:t>
             </a:fld>
             <a:endParaRPr lang="de-DE"/>
           </a:p>
@@ -475,7 +475,7 @@
     </p:spTree>
     <p:extLst>
       <p:ext uri="{BB962C8B-B14F-4D97-AF65-F5344CB8AC3E}">
-        <p14:creationId xmlns:p14="http://schemas.microsoft.com/office/powerpoint/2010/main" val="3313384943"/>
+        <p14:creationId xmlns:p14="http://schemas.microsoft.com/office/powerpoint/2010/main" val="556916641"/>
       </p:ext>
     </p:extLst>
   </p:cSld>
@@ -514,8 +514,8 @@
         </p:nvSpPr>
         <p:spPr>
           <a:xfrm>
-            <a:off x="6543676" y="325823"/>
-            <a:ext cx="1971675" cy="5186259"/>
+            <a:off x="6543675" y="297087"/>
+            <a:ext cx="1971675" cy="4728845"/>
           </a:xfrm>
         </p:spPr>
         <p:txBody>
@@ -542,8 +542,8 @@
         </p:nvSpPr>
         <p:spPr>
           <a:xfrm>
-            <a:off x="628651" y="325823"/>
-            <a:ext cx="5800725" cy="5186259"/>
+            <a:off x="628650" y="297087"/>
+            <a:ext cx="5800725" cy="4728845"/>
           </a:xfrm>
         </p:spPr>
         <p:txBody>
@@ -604,7 +604,7 @@
           <a:p>
             <a:fld id="{300DB245-849F-4AAA-AD3E-676A6FA9CB3B}" type="datetimeFigureOut">
               <a:rPr lang="de-DE" smtClean="0"/>
-              <a:t>22.11.2016</a:t>
+              <a:t>20.01.2017</a:t>
             </a:fld>
             <a:endParaRPr lang="de-DE"/>
           </a:p>
@@ -655,7 +655,7 @@
     </p:spTree>
     <p:extLst>
       <p:ext uri="{BB962C8B-B14F-4D97-AF65-F5344CB8AC3E}">
-        <p14:creationId xmlns:p14="http://schemas.microsoft.com/office/powerpoint/2010/main" val="1599748899"/>
+        <p14:creationId xmlns:p14="http://schemas.microsoft.com/office/powerpoint/2010/main" val="3491475566"/>
       </p:ext>
     </p:extLst>
   </p:cSld>
@@ -774,7 +774,7 @@
           <a:p>
             <a:fld id="{300DB245-849F-4AAA-AD3E-676A6FA9CB3B}" type="datetimeFigureOut">
               <a:rPr lang="de-DE" smtClean="0"/>
-              <a:t>22.11.2016</a:t>
+              <a:t>20.01.2017</a:t>
             </a:fld>
             <a:endParaRPr lang="de-DE"/>
           </a:p>
@@ -825,7 +825,7 @@
     </p:spTree>
     <p:extLst>
       <p:ext uri="{BB962C8B-B14F-4D97-AF65-F5344CB8AC3E}">
-        <p14:creationId xmlns:p14="http://schemas.microsoft.com/office/powerpoint/2010/main" val="3629842992"/>
+        <p14:creationId xmlns:p14="http://schemas.microsoft.com/office/powerpoint/2010/main" val="2928856839"/>
       </p:ext>
     </p:extLst>
   </p:cSld>
@@ -864,15 +864,15 @@
         </p:nvSpPr>
         <p:spPr>
           <a:xfrm>
-            <a:off x="623888" y="1525705"/>
-            <a:ext cx="7886700" cy="2545672"/>
+            <a:off x="623888" y="1391141"/>
+            <a:ext cx="7886700" cy="2321151"/>
           </a:xfrm>
         </p:spPr>
         <p:txBody>
           <a:bodyPr anchor="b"/>
           <a:lstStyle>
             <a:lvl1pPr>
-              <a:defRPr sz="5354"/>
+              <a:defRPr sz="4500"/>
             </a:lvl1pPr>
           </a:lstStyle>
           <a:p>
@@ -896,8 +896,8 @@
         </p:nvSpPr>
         <p:spPr>
           <a:xfrm>
-            <a:off x="623888" y="4095460"/>
-            <a:ext cx="7886700" cy="1338709"/>
+            <a:off x="623888" y="3734251"/>
+            <a:ext cx="7886700" cy="1220638"/>
           </a:xfrm>
         </p:spPr>
         <p:txBody>
@@ -905,15 +905,17 @@
           <a:lstStyle>
             <a:lvl1pPr marL="0" indent="0">
               <a:buNone/>
-              <a:defRPr sz="2142">
+              <a:defRPr sz="1800">
                 <a:solidFill>
-                  <a:schemeClr val="tx1"/>
+                  <a:schemeClr val="tx1">
+                    <a:tint val="75000"/>
+                  </a:schemeClr>
                 </a:solidFill>
               </a:defRPr>
             </a:lvl1pPr>
-            <a:lvl2pPr marL="408005" indent="0">
-              <a:buNone/>
-              <a:defRPr sz="1785">
+            <a:lvl2pPr marL="342900" indent="0">
+              <a:buNone/>
+              <a:defRPr sz="1500">
                 <a:solidFill>
                   <a:schemeClr val="tx1">
                     <a:tint val="75000"/>
@@ -921,9 +923,9 @@
                 </a:solidFill>
               </a:defRPr>
             </a:lvl2pPr>
-            <a:lvl3pPr marL="816011" indent="0">
-              <a:buNone/>
-              <a:defRPr sz="1606">
+            <a:lvl3pPr marL="685800" indent="0">
+              <a:buNone/>
+              <a:defRPr sz="1350">
                 <a:solidFill>
                   <a:schemeClr val="tx1">
                     <a:tint val="75000"/>
@@ -931,9 +933,9 @@
                 </a:solidFill>
               </a:defRPr>
             </a:lvl3pPr>
-            <a:lvl4pPr marL="1224016" indent="0">
-              <a:buNone/>
-              <a:defRPr sz="1428">
+            <a:lvl4pPr marL="1028700" indent="0">
+              <a:buNone/>
+              <a:defRPr sz="1200">
                 <a:solidFill>
                   <a:schemeClr val="tx1">
                     <a:tint val="75000"/>
@@ -941,9 +943,9 @@
                 </a:solidFill>
               </a:defRPr>
             </a:lvl4pPr>
-            <a:lvl5pPr marL="1632021" indent="0">
-              <a:buNone/>
-              <a:defRPr sz="1428">
+            <a:lvl5pPr marL="1371600" indent="0">
+              <a:buNone/>
+              <a:defRPr sz="1200">
                 <a:solidFill>
                   <a:schemeClr val="tx1">
                     <a:tint val="75000"/>
@@ -951,9 +953,9 @@
                 </a:solidFill>
               </a:defRPr>
             </a:lvl5pPr>
-            <a:lvl6pPr marL="2040026" indent="0">
-              <a:buNone/>
-              <a:defRPr sz="1428">
+            <a:lvl6pPr marL="1714500" indent="0">
+              <a:buNone/>
+              <a:defRPr sz="1200">
                 <a:solidFill>
                   <a:schemeClr val="tx1">
                     <a:tint val="75000"/>
@@ -961,9 +963,9 @@
                 </a:solidFill>
               </a:defRPr>
             </a:lvl6pPr>
-            <a:lvl7pPr marL="2448032" indent="0">
-              <a:buNone/>
-              <a:defRPr sz="1428">
+            <a:lvl7pPr marL="2057400" indent="0">
+              <a:buNone/>
+              <a:defRPr sz="1200">
                 <a:solidFill>
                   <a:schemeClr val="tx1">
                     <a:tint val="75000"/>
@@ -971,9 +973,9 @@
                 </a:solidFill>
               </a:defRPr>
             </a:lvl7pPr>
-            <a:lvl8pPr marL="2856037" indent="0">
-              <a:buNone/>
-              <a:defRPr sz="1428">
+            <a:lvl8pPr marL="2400300" indent="0">
+              <a:buNone/>
+              <a:defRPr sz="1200">
                 <a:solidFill>
                   <a:schemeClr val="tx1">
                     <a:tint val="75000"/>
@@ -981,9 +983,9 @@
                 </a:solidFill>
               </a:defRPr>
             </a:lvl8pPr>
-            <a:lvl9pPr marL="3264042" indent="0">
-              <a:buNone/>
-              <a:defRPr sz="1428">
+            <a:lvl9pPr marL="2743200" indent="0">
+              <a:buNone/>
+              <a:defRPr sz="1200">
                 <a:solidFill>
                   <a:schemeClr val="tx1">
                     <a:tint val="75000"/>
@@ -1018,7 +1020,7 @@
           <a:p>
             <a:fld id="{300DB245-849F-4AAA-AD3E-676A6FA9CB3B}" type="datetimeFigureOut">
               <a:rPr lang="de-DE" smtClean="0"/>
-              <a:t>22.11.2016</a:t>
+              <a:t>20.01.2017</a:t>
             </a:fld>
             <a:endParaRPr lang="de-DE"/>
           </a:p>
@@ -1069,7 +1071,7 @@
     </p:spTree>
     <p:extLst>
       <p:ext uri="{BB962C8B-B14F-4D97-AF65-F5344CB8AC3E}">
-        <p14:creationId xmlns:p14="http://schemas.microsoft.com/office/powerpoint/2010/main" val="2463933303"/>
+        <p14:creationId xmlns:p14="http://schemas.microsoft.com/office/powerpoint/2010/main" val="4222419057"/>
       </p:ext>
     </p:extLst>
   </p:cSld>
@@ -1131,8 +1133,8 @@
         </p:nvSpPr>
         <p:spPr>
           <a:xfrm>
-            <a:off x="628650" y="1629117"/>
-            <a:ext cx="3886200" cy="3882965"/>
+            <a:off x="628650" y="1485433"/>
+            <a:ext cx="3886200" cy="3540499"/>
           </a:xfrm>
         </p:spPr>
         <p:txBody>
@@ -1188,8 +1190,8 @@
         </p:nvSpPr>
         <p:spPr>
           <a:xfrm>
-            <a:off x="4629150" y="1629117"/>
-            <a:ext cx="3886200" cy="3882965"/>
+            <a:off x="4629150" y="1485433"/>
+            <a:ext cx="3886200" cy="3540499"/>
           </a:xfrm>
         </p:spPr>
         <p:txBody>
@@ -1250,7 +1252,7 @@
           <a:p>
             <a:fld id="{300DB245-849F-4AAA-AD3E-676A6FA9CB3B}" type="datetimeFigureOut">
               <a:rPr lang="de-DE" smtClean="0"/>
-              <a:t>22.11.2016</a:t>
+              <a:t>20.01.2017</a:t>
             </a:fld>
             <a:endParaRPr lang="de-DE"/>
           </a:p>
@@ -1301,7 +1303,7 @@
     </p:spTree>
     <p:extLst>
       <p:ext uri="{BB962C8B-B14F-4D97-AF65-F5344CB8AC3E}">
-        <p14:creationId xmlns:p14="http://schemas.microsoft.com/office/powerpoint/2010/main" val="2486579328"/>
+        <p14:creationId xmlns:p14="http://schemas.microsoft.com/office/powerpoint/2010/main" val="2268316149"/>
       </p:ext>
     </p:extLst>
   </p:cSld>
@@ -1340,8 +1342,8 @@
         </p:nvSpPr>
         <p:spPr>
           <a:xfrm>
-            <a:off x="629841" y="325825"/>
-            <a:ext cx="7886700" cy="1182881"/>
+            <a:off x="629841" y="297087"/>
+            <a:ext cx="7886700" cy="1078554"/>
           </a:xfrm>
         </p:spPr>
         <p:txBody>
@@ -1368,8 +1370,8 @@
         </p:nvSpPr>
         <p:spPr>
           <a:xfrm>
-            <a:off x="629842" y="1500205"/>
-            <a:ext cx="3868340" cy="735227"/>
+            <a:off x="629842" y="1367891"/>
+            <a:ext cx="3868340" cy="670382"/>
           </a:xfrm>
         </p:spPr>
         <p:txBody>
@@ -1377,39 +1379,39 @@
           <a:lstStyle>
             <a:lvl1pPr marL="0" indent="0">
               <a:buNone/>
-              <a:defRPr sz="2142" b="1"/>
+              <a:defRPr sz="1800" b="1"/>
             </a:lvl1pPr>
-            <a:lvl2pPr marL="408005" indent="0">
-              <a:buNone/>
-              <a:defRPr sz="1785" b="1"/>
+            <a:lvl2pPr marL="342900" indent="0">
+              <a:buNone/>
+              <a:defRPr sz="1500" b="1"/>
             </a:lvl2pPr>
-            <a:lvl3pPr marL="816011" indent="0">
-              <a:buNone/>
-              <a:defRPr sz="1606" b="1"/>
+            <a:lvl3pPr marL="685800" indent="0">
+              <a:buNone/>
+              <a:defRPr sz="1350" b="1"/>
             </a:lvl3pPr>
-            <a:lvl4pPr marL="1224016" indent="0">
-              <a:buNone/>
-              <a:defRPr sz="1428" b="1"/>
+            <a:lvl4pPr marL="1028700" indent="0">
+              <a:buNone/>
+              <a:defRPr sz="1200" b="1"/>
             </a:lvl4pPr>
-            <a:lvl5pPr marL="1632021" indent="0">
-              <a:buNone/>
-              <a:defRPr sz="1428" b="1"/>
+            <a:lvl5pPr marL="1371600" indent="0">
+              <a:buNone/>
+              <a:defRPr sz="1200" b="1"/>
             </a:lvl5pPr>
-            <a:lvl6pPr marL="2040026" indent="0">
-              <a:buNone/>
-              <a:defRPr sz="1428" b="1"/>
+            <a:lvl6pPr marL="1714500" indent="0">
+              <a:buNone/>
+              <a:defRPr sz="1200" b="1"/>
             </a:lvl6pPr>
-            <a:lvl7pPr marL="2448032" indent="0">
-              <a:buNone/>
-              <a:defRPr sz="1428" b="1"/>
+            <a:lvl7pPr marL="2057400" indent="0">
+              <a:buNone/>
+              <a:defRPr sz="1200" b="1"/>
             </a:lvl7pPr>
-            <a:lvl8pPr marL="2856037" indent="0">
-              <a:buNone/>
-              <a:defRPr sz="1428" b="1"/>
+            <a:lvl8pPr marL="2400300" indent="0">
+              <a:buNone/>
+              <a:defRPr sz="1200" b="1"/>
             </a:lvl8pPr>
-            <a:lvl9pPr marL="3264042" indent="0">
-              <a:buNone/>
-              <a:defRPr sz="1428" b="1"/>
+            <a:lvl9pPr marL="2743200" indent="0">
+              <a:buNone/>
+              <a:defRPr sz="1200" b="1"/>
             </a:lvl9pPr>
           </a:lstStyle>
           <a:p>
@@ -1433,8 +1435,8 @@
         </p:nvSpPr>
         <p:spPr>
           <a:xfrm>
-            <a:off x="629842" y="2235432"/>
-            <a:ext cx="3868340" cy="3287983"/>
+            <a:off x="629842" y="2038273"/>
+            <a:ext cx="3868340" cy="2997993"/>
           </a:xfrm>
         </p:spPr>
         <p:txBody>
@@ -1490,8 +1492,8 @@
         </p:nvSpPr>
         <p:spPr>
           <a:xfrm>
-            <a:off x="4629151" y="1500205"/>
-            <a:ext cx="3887391" cy="735227"/>
+            <a:off x="4629150" y="1367891"/>
+            <a:ext cx="3887391" cy="670382"/>
           </a:xfrm>
         </p:spPr>
         <p:txBody>
@@ -1499,39 +1501,39 @@
           <a:lstStyle>
             <a:lvl1pPr marL="0" indent="0">
               <a:buNone/>
-              <a:defRPr sz="2142" b="1"/>
+              <a:defRPr sz="1800" b="1"/>
             </a:lvl1pPr>
-            <a:lvl2pPr marL="408005" indent="0">
-              <a:buNone/>
-              <a:defRPr sz="1785" b="1"/>
+            <a:lvl2pPr marL="342900" indent="0">
+              <a:buNone/>
+              <a:defRPr sz="1500" b="1"/>
             </a:lvl2pPr>
-            <a:lvl3pPr marL="816011" indent="0">
-              <a:buNone/>
-              <a:defRPr sz="1606" b="1"/>
+            <a:lvl3pPr marL="685800" indent="0">
+              <a:buNone/>
+              <a:defRPr sz="1350" b="1"/>
             </a:lvl3pPr>
-            <a:lvl4pPr marL="1224016" indent="0">
-              <a:buNone/>
-              <a:defRPr sz="1428" b="1"/>
+            <a:lvl4pPr marL="1028700" indent="0">
+              <a:buNone/>
+              <a:defRPr sz="1200" b="1"/>
             </a:lvl4pPr>
-            <a:lvl5pPr marL="1632021" indent="0">
-              <a:buNone/>
-              <a:defRPr sz="1428" b="1"/>
+            <a:lvl5pPr marL="1371600" indent="0">
+              <a:buNone/>
+              <a:defRPr sz="1200" b="1"/>
             </a:lvl5pPr>
-            <a:lvl6pPr marL="2040026" indent="0">
-              <a:buNone/>
-              <a:defRPr sz="1428" b="1"/>
+            <a:lvl6pPr marL="1714500" indent="0">
+              <a:buNone/>
+              <a:defRPr sz="1200" b="1"/>
             </a:lvl6pPr>
-            <a:lvl7pPr marL="2448032" indent="0">
-              <a:buNone/>
-              <a:defRPr sz="1428" b="1"/>
+            <a:lvl7pPr marL="2057400" indent="0">
+              <a:buNone/>
+              <a:defRPr sz="1200" b="1"/>
             </a:lvl7pPr>
-            <a:lvl8pPr marL="2856037" indent="0">
-              <a:buNone/>
-              <a:defRPr sz="1428" b="1"/>
+            <a:lvl8pPr marL="2400300" indent="0">
+              <a:buNone/>
+              <a:defRPr sz="1200" b="1"/>
             </a:lvl8pPr>
-            <a:lvl9pPr marL="3264042" indent="0">
-              <a:buNone/>
-              <a:defRPr sz="1428" b="1"/>
+            <a:lvl9pPr marL="2743200" indent="0">
+              <a:buNone/>
+              <a:defRPr sz="1200" b="1"/>
             </a:lvl9pPr>
           </a:lstStyle>
           <a:p>
@@ -1555,8 +1557,8 @@
         </p:nvSpPr>
         <p:spPr>
           <a:xfrm>
-            <a:off x="4629151" y="2235432"/>
-            <a:ext cx="3887391" cy="3287983"/>
+            <a:off x="4629150" y="2038273"/>
+            <a:ext cx="3887391" cy="2997993"/>
           </a:xfrm>
         </p:spPr>
         <p:txBody>
@@ -1617,7 +1619,7 @@
           <a:p>
             <a:fld id="{300DB245-849F-4AAA-AD3E-676A6FA9CB3B}" type="datetimeFigureOut">
               <a:rPr lang="de-DE" smtClean="0"/>
-              <a:t>22.11.2016</a:t>
+              <a:t>20.01.2017</a:t>
             </a:fld>
             <a:endParaRPr lang="de-DE"/>
           </a:p>
@@ -1668,7 +1670,7 @@
     </p:spTree>
     <p:extLst>
       <p:ext uri="{BB962C8B-B14F-4D97-AF65-F5344CB8AC3E}">
-        <p14:creationId xmlns:p14="http://schemas.microsoft.com/office/powerpoint/2010/main" val="3186667475"/>
+        <p14:creationId xmlns:p14="http://schemas.microsoft.com/office/powerpoint/2010/main" val="3431123680"/>
       </p:ext>
     </p:extLst>
   </p:cSld>
@@ -1735,7 +1737,7 @@
           <a:p>
             <a:fld id="{300DB245-849F-4AAA-AD3E-676A6FA9CB3B}" type="datetimeFigureOut">
               <a:rPr lang="de-DE" smtClean="0"/>
-              <a:t>22.11.2016</a:t>
+              <a:t>20.01.2017</a:t>
             </a:fld>
             <a:endParaRPr lang="de-DE"/>
           </a:p>
@@ -1786,7 +1788,7 @@
     </p:spTree>
     <p:extLst>
       <p:ext uri="{BB962C8B-B14F-4D97-AF65-F5344CB8AC3E}">
-        <p14:creationId xmlns:p14="http://schemas.microsoft.com/office/powerpoint/2010/main" val="280056742"/>
+        <p14:creationId xmlns:p14="http://schemas.microsoft.com/office/powerpoint/2010/main" val="104264499"/>
       </p:ext>
     </p:extLst>
   </p:cSld>
@@ -1830,7 +1832,7 @@
           <a:p>
             <a:fld id="{300DB245-849F-4AAA-AD3E-676A6FA9CB3B}" type="datetimeFigureOut">
               <a:rPr lang="de-DE" smtClean="0"/>
-              <a:t>22.11.2016</a:t>
+              <a:t>20.01.2017</a:t>
             </a:fld>
             <a:endParaRPr lang="de-DE"/>
           </a:p>
@@ -1881,7 +1883,7 @@
     </p:spTree>
     <p:extLst>
       <p:ext uri="{BB962C8B-B14F-4D97-AF65-F5344CB8AC3E}">
-        <p14:creationId xmlns:p14="http://schemas.microsoft.com/office/powerpoint/2010/main" val="2583166854"/>
+        <p14:creationId xmlns:p14="http://schemas.microsoft.com/office/powerpoint/2010/main" val="53626979"/>
       </p:ext>
     </p:extLst>
   </p:cSld>
@@ -1920,15 +1922,15 @@
         </p:nvSpPr>
         <p:spPr>
           <a:xfrm>
-            <a:off x="629841" y="407988"/>
-            <a:ext cx="2949178" cy="1427956"/>
+            <a:off x="629841" y="372004"/>
+            <a:ext cx="2949178" cy="1302015"/>
           </a:xfrm>
         </p:spPr>
         <p:txBody>
           <a:bodyPr anchor="b"/>
           <a:lstStyle>
             <a:lvl1pPr>
-              <a:defRPr sz="2856"/>
+              <a:defRPr sz="2400"/>
             </a:lvl1pPr>
           </a:lstStyle>
           <a:p>
@@ -1952,39 +1954,39 @@
         </p:nvSpPr>
         <p:spPr>
           <a:xfrm>
-            <a:off x="3887391" y="881141"/>
-            <a:ext cx="4629150" cy="4349034"/>
+            <a:off x="3887391" y="803426"/>
+            <a:ext cx="4629150" cy="3965461"/>
           </a:xfrm>
         </p:spPr>
         <p:txBody>
           <a:bodyPr/>
           <a:lstStyle>
             <a:lvl1pPr>
-              <a:defRPr sz="2856"/>
+              <a:defRPr sz="2400"/>
             </a:lvl1pPr>
             <a:lvl2pPr>
-              <a:defRPr sz="2499"/>
+              <a:defRPr sz="2100"/>
             </a:lvl2pPr>
             <a:lvl3pPr>
-              <a:defRPr sz="2142"/>
+              <a:defRPr sz="1800"/>
             </a:lvl3pPr>
             <a:lvl4pPr>
-              <a:defRPr sz="1785"/>
+              <a:defRPr sz="1500"/>
             </a:lvl4pPr>
             <a:lvl5pPr>
-              <a:defRPr sz="1785"/>
+              <a:defRPr sz="1500"/>
             </a:lvl5pPr>
             <a:lvl6pPr>
-              <a:defRPr sz="1785"/>
+              <a:defRPr sz="1500"/>
             </a:lvl6pPr>
             <a:lvl7pPr>
-              <a:defRPr sz="1785"/>
+              <a:defRPr sz="1500"/>
             </a:lvl7pPr>
             <a:lvl8pPr>
-              <a:defRPr sz="1785"/>
+              <a:defRPr sz="1500"/>
             </a:lvl8pPr>
             <a:lvl9pPr>
-              <a:defRPr sz="1785"/>
+              <a:defRPr sz="1500"/>
             </a:lvl9pPr>
           </a:lstStyle>
           <a:p>
@@ -2037,8 +2039,8 @@
         </p:nvSpPr>
         <p:spPr>
           <a:xfrm>
-            <a:off x="629841" y="1835944"/>
-            <a:ext cx="2949178" cy="3401313"/>
+            <a:off x="629841" y="1674019"/>
+            <a:ext cx="2949178" cy="3101327"/>
           </a:xfrm>
         </p:spPr>
         <p:txBody>
@@ -2046,39 +2048,39 @@
           <a:lstStyle>
             <a:lvl1pPr marL="0" indent="0">
               <a:buNone/>
-              <a:defRPr sz="1428"/>
+              <a:defRPr sz="1200"/>
             </a:lvl1pPr>
-            <a:lvl2pPr marL="408005" indent="0">
-              <a:buNone/>
-              <a:defRPr sz="1249"/>
+            <a:lvl2pPr marL="342900" indent="0">
+              <a:buNone/>
+              <a:defRPr sz="1050"/>
             </a:lvl2pPr>
-            <a:lvl3pPr marL="816011" indent="0">
-              <a:buNone/>
-              <a:defRPr sz="1071"/>
+            <a:lvl3pPr marL="685800" indent="0">
+              <a:buNone/>
+              <a:defRPr sz="900"/>
             </a:lvl3pPr>
-            <a:lvl4pPr marL="1224016" indent="0">
-              <a:buNone/>
-              <a:defRPr sz="892"/>
+            <a:lvl4pPr marL="1028700" indent="0">
+              <a:buNone/>
+              <a:defRPr sz="750"/>
             </a:lvl4pPr>
-            <a:lvl5pPr marL="1632021" indent="0">
-              <a:buNone/>
-              <a:defRPr sz="892"/>
+            <a:lvl5pPr marL="1371600" indent="0">
+              <a:buNone/>
+              <a:defRPr sz="750"/>
             </a:lvl5pPr>
-            <a:lvl6pPr marL="2040026" indent="0">
-              <a:buNone/>
-              <a:defRPr sz="892"/>
+            <a:lvl6pPr marL="1714500" indent="0">
+              <a:buNone/>
+              <a:defRPr sz="750"/>
             </a:lvl6pPr>
-            <a:lvl7pPr marL="2448032" indent="0">
-              <a:buNone/>
-              <a:defRPr sz="892"/>
+            <a:lvl7pPr marL="2057400" indent="0">
+              <a:buNone/>
+              <a:defRPr sz="750"/>
             </a:lvl7pPr>
-            <a:lvl8pPr marL="2856037" indent="0">
-              <a:buNone/>
-              <a:defRPr sz="892"/>
+            <a:lvl8pPr marL="2400300" indent="0">
+              <a:buNone/>
+              <a:defRPr sz="750"/>
             </a:lvl8pPr>
-            <a:lvl9pPr marL="3264042" indent="0">
-              <a:buNone/>
-              <a:defRPr sz="892"/>
+            <a:lvl9pPr marL="2743200" indent="0">
+              <a:buNone/>
+              <a:defRPr sz="750"/>
             </a:lvl9pPr>
           </a:lstStyle>
           <a:p>
@@ -2107,7 +2109,7 @@
           <a:p>
             <a:fld id="{300DB245-849F-4AAA-AD3E-676A6FA9CB3B}" type="datetimeFigureOut">
               <a:rPr lang="de-DE" smtClean="0"/>
-              <a:t>22.11.2016</a:t>
+              <a:t>20.01.2017</a:t>
             </a:fld>
             <a:endParaRPr lang="de-DE"/>
           </a:p>
@@ -2158,7 +2160,7 @@
     </p:spTree>
     <p:extLst>
       <p:ext uri="{BB962C8B-B14F-4D97-AF65-F5344CB8AC3E}">
-        <p14:creationId xmlns:p14="http://schemas.microsoft.com/office/powerpoint/2010/main" val="1527776751"/>
+        <p14:creationId xmlns:p14="http://schemas.microsoft.com/office/powerpoint/2010/main" val="2340301086"/>
       </p:ext>
     </p:extLst>
   </p:cSld>
@@ -2197,15 +2199,15 @@
         </p:nvSpPr>
         <p:spPr>
           <a:xfrm>
-            <a:off x="629841" y="407988"/>
-            <a:ext cx="2949178" cy="1427956"/>
+            <a:off x="629841" y="372004"/>
+            <a:ext cx="2949178" cy="1302015"/>
           </a:xfrm>
         </p:spPr>
         <p:txBody>
           <a:bodyPr anchor="b"/>
           <a:lstStyle>
             <a:lvl1pPr>
-              <a:defRPr sz="2856"/>
+              <a:defRPr sz="2400"/>
             </a:lvl1pPr>
           </a:lstStyle>
           <a:p>
@@ -2229,8 +2231,8 @@
         </p:nvSpPr>
         <p:spPr>
           <a:xfrm>
-            <a:off x="3887391" y="881141"/>
-            <a:ext cx="4629150" cy="4349034"/>
+            <a:off x="3887391" y="803426"/>
+            <a:ext cx="4629150" cy="3965461"/>
           </a:xfrm>
         </p:spPr>
         <p:txBody>
@@ -2238,39 +2240,39 @@
           <a:lstStyle>
             <a:lvl1pPr marL="0" indent="0">
               <a:buNone/>
-              <a:defRPr sz="2856"/>
+              <a:defRPr sz="2400"/>
             </a:lvl1pPr>
-            <a:lvl2pPr marL="408005" indent="0">
-              <a:buNone/>
-              <a:defRPr sz="2499"/>
+            <a:lvl2pPr marL="342900" indent="0">
+              <a:buNone/>
+              <a:defRPr sz="2100"/>
             </a:lvl2pPr>
-            <a:lvl3pPr marL="816011" indent="0">
-              <a:buNone/>
-              <a:defRPr sz="2142"/>
+            <a:lvl3pPr marL="685800" indent="0">
+              <a:buNone/>
+              <a:defRPr sz="1800"/>
             </a:lvl3pPr>
-            <a:lvl4pPr marL="1224016" indent="0">
-              <a:buNone/>
-              <a:defRPr sz="1785"/>
+            <a:lvl4pPr marL="1028700" indent="0">
+              <a:buNone/>
+              <a:defRPr sz="1500"/>
             </a:lvl4pPr>
-            <a:lvl5pPr marL="1632021" indent="0">
-              <a:buNone/>
-              <a:defRPr sz="1785"/>
+            <a:lvl5pPr marL="1371600" indent="0">
+              <a:buNone/>
+              <a:defRPr sz="1500"/>
             </a:lvl5pPr>
-            <a:lvl6pPr marL="2040026" indent="0">
-              <a:buNone/>
-              <a:defRPr sz="1785"/>
+            <a:lvl6pPr marL="1714500" indent="0">
+              <a:buNone/>
+              <a:defRPr sz="1500"/>
             </a:lvl6pPr>
-            <a:lvl7pPr marL="2448032" indent="0">
-              <a:buNone/>
-              <a:defRPr sz="1785"/>
+            <a:lvl7pPr marL="2057400" indent="0">
+              <a:buNone/>
+              <a:defRPr sz="1500"/>
             </a:lvl7pPr>
-            <a:lvl8pPr marL="2856037" indent="0">
-              <a:buNone/>
-              <a:defRPr sz="1785"/>
+            <a:lvl8pPr marL="2400300" indent="0">
+              <a:buNone/>
+              <a:defRPr sz="1500"/>
             </a:lvl8pPr>
-            <a:lvl9pPr marL="3264042" indent="0">
-              <a:buNone/>
-              <a:defRPr sz="1785"/>
+            <a:lvl9pPr marL="2743200" indent="0">
+              <a:buNone/>
+              <a:defRPr sz="1500"/>
             </a:lvl9pPr>
           </a:lstStyle>
           <a:p>
@@ -2278,7 +2280,7 @@
               <a:rPr lang="de-DE" smtClean="0"/>
               <a:t>Bild durch Klicken auf Symbol hinzufügen</a:t>
             </a:r>
-            <a:endParaRPr lang="en-US"/>
+            <a:endParaRPr lang="en-US" dirty="0"/>
           </a:p>
         </p:txBody>
       </p:sp>
@@ -2294,8 +2296,8 @@
         </p:nvSpPr>
         <p:spPr>
           <a:xfrm>
-            <a:off x="629841" y="1835944"/>
-            <a:ext cx="2949178" cy="3401313"/>
+            <a:off x="629841" y="1674019"/>
+            <a:ext cx="2949178" cy="3101327"/>
           </a:xfrm>
         </p:spPr>
         <p:txBody>
@@ -2303,39 +2305,39 @@
           <a:lstStyle>
             <a:lvl1pPr marL="0" indent="0">
               <a:buNone/>
-              <a:defRPr sz="1428"/>
+              <a:defRPr sz="1200"/>
             </a:lvl1pPr>
-            <a:lvl2pPr marL="408005" indent="0">
-              <a:buNone/>
-              <a:defRPr sz="1249"/>
+            <a:lvl2pPr marL="342900" indent="0">
+              <a:buNone/>
+              <a:defRPr sz="1050"/>
             </a:lvl2pPr>
-            <a:lvl3pPr marL="816011" indent="0">
-              <a:buNone/>
-              <a:defRPr sz="1071"/>
+            <a:lvl3pPr marL="685800" indent="0">
+              <a:buNone/>
+              <a:defRPr sz="900"/>
             </a:lvl3pPr>
-            <a:lvl4pPr marL="1224016" indent="0">
-              <a:buNone/>
-              <a:defRPr sz="892"/>
+            <a:lvl4pPr marL="1028700" indent="0">
+              <a:buNone/>
+              <a:defRPr sz="750"/>
             </a:lvl4pPr>
-            <a:lvl5pPr marL="1632021" indent="0">
-              <a:buNone/>
-              <a:defRPr sz="892"/>
+            <a:lvl5pPr marL="1371600" indent="0">
+              <a:buNone/>
+              <a:defRPr sz="750"/>
             </a:lvl5pPr>
-            <a:lvl6pPr marL="2040026" indent="0">
-              <a:buNone/>
-              <a:defRPr sz="892"/>
+            <a:lvl6pPr marL="1714500" indent="0">
+              <a:buNone/>
+              <a:defRPr sz="750"/>
             </a:lvl6pPr>
-            <a:lvl7pPr marL="2448032" indent="0">
-              <a:buNone/>
-              <a:defRPr sz="892"/>
+            <a:lvl7pPr marL="2057400" indent="0">
+              <a:buNone/>
+              <a:defRPr sz="750"/>
             </a:lvl7pPr>
-            <a:lvl8pPr marL="2856037" indent="0">
-              <a:buNone/>
-              <a:defRPr sz="892"/>
+            <a:lvl8pPr marL="2400300" indent="0">
+              <a:buNone/>
+              <a:defRPr sz="750"/>
             </a:lvl8pPr>
-            <a:lvl9pPr marL="3264042" indent="0">
-              <a:buNone/>
-              <a:defRPr sz="892"/>
+            <a:lvl9pPr marL="2743200" indent="0">
+              <a:buNone/>
+              <a:defRPr sz="750"/>
             </a:lvl9pPr>
           </a:lstStyle>
           <a:p>
@@ -2364,7 +2366,7 @@
           <a:p>
             <a:fld id="{300DB245-849F-4AAA-AD3E-676A6FA9CB3B}" type="datetimeFigureOut">
               <a:rPr lang="de-DE" smtClean="0"/>
-              <a:t>22.11.2016</a:t>
+              <a:t>20.01.2017</a:t>
             </a:fld>
             <a:endParaRPr lang="de-DE"/>
           </a:p>
@@ -2415,7 +2417,7 @@
     </p:spTree>
     <p:extLst>
       <p:ext uri="{BB962C8B-B14F-4D97-AF65-F5344CB8AC3E}">
-        <p14:creationId xmlns:p14="http://schemas.microsoft.com/office/powerpoint/2010/main" val="60842538"/>
+        <p14:creationId xmlns:p14="http://schemas.microsoft.com/office/powerpoint/2010/main" val="2231719259"/>
       </p:ext>
     </p:extLst>
   </p:cSld>
@@ -2459,8 +2461,8 @@
         </p:nvSpPr>
         <p:spPr>
           <a:xfrm>
-            <a:off x="628650" y="325825"/>
-            <a:ext cx="7886700" cy="1182881"/>
+            <a:off x="628650" y="297087"/>
+            <a:ext cx="7886700" cy="1078554"/>
           </a:xfrm>
           <a:prstGeom prst="rect">
             <a:avLst/>
@@ -2492,8 +2494,8 @@
         </p:nvSpPr>
         <p:spPr>
           <a:xfrm>
-            <a:off x="628650" y="1629117"/>
-            <a:ext cx="7886700" cy="3882965"/>
+            <a:off x="628650" y="1485433"/>
+            <a:ext cx="7886700" cy="3540499"/>
           </a:xfrm>
           <a:prstGeom prst="rect">
             <a:avLst/>
@@ -2554,8 +2556,8 @@
         </p:nvSpPr>
         <p:spPr>
           <a:xfrm>
-            <a:off x="628650" y="5672162"/>
-            <a:ext cx="2057400" cy="325823"/>
+            <a:off x="628650" y="5171892"/>
+            <a:ext cx="2057400" cy="297087"/>
           </a:xfrm>
           <a:prstGeom prst="rect">
             <a:avLst/>
@@ -2565,7 +2567,7 @@
           <a:bodyPr vert="horz" lIns="91440" tIns="45720" rIns="91440" bIns="45720" rtlCol="0" anchor="ctr"/>
           <a:lstStyle>
             <a:lvl1pPr algn="l">
-              <a:defRPr sz="1071">
+              <a:defRPr sz="900">
                 <a:solidFill>
                   <a:schemeClr val="tx1">
                     <a:tint val="75000"/>
@@ -2577,7 +2579,7 @@
           <a:p>
             <a:fld id="{300DB245-849F-4AAA-AD3E-676A6FA9CB3B}" type="datetimeFigureOut">
               <a:rPr lang="de-DE" smtClean="0"/>
-              <a:t>22.11.2016</a:t>
+              <a:t>20.01.2017</a:t>
             </a:fld>
             <a:endParaRPr lang="de-DE"/>
           </a:p>
@@ -2595,8 +2597,8 @@
         </p:nvSpPr>
         <p:spPr>
           <a:xfrm>
-            <a:off x="3028950" y="5672162"/>
-            <a:ext cx="3086100" cy="325823"/>
+            <a:off x="3028950" y="5171892"/>
+            <a:ext cx="3086100" cy="297087"/>
           </a:xfrm>
           <a:prstGeom prst="rect">
             <a:avLst/>
@@ -2606,7 +2608,7 @@
           <a:bodyPr vert="horz" lIns="91440" tIns="45720" rIns="91440" bIns="45720" rtlCol="0" anchor="ctr"/>
           <a:lstStyle>
             <a:lvl1pPr algn="ctr">
-              <a:defRPr sz="1071">
+              <a:defRPr sz="900">
                 <a:solidFill>
                   <a:schemeClr val="tx1">
                     <a:tint val="75000"/>
@@ -2632,8 +2634,8 @@
         </p:nvSpPr>
         <p:spPr>
           <a:xfrm>
-            <a:off x="6457950" y="5672162"/>
-            <a:ext cx="2057400" cy="325823"/>
+            <a:off x="6457950" y="5171892"/>
+            <a:ext cx="2057400" cy="297087"/>
           </a:xfrm>
           <a:prstGeom prst="rect">
             <a:avLst/>
@@ -2643,7 +2645,7 @@
           <a:bodyPr vert="horz" lIns="91440" tIns="45720" rIns="91440" bIns="45720" rtlCol="0" anchor="ctr"/>
           <a:lstStyle>
             <a:lvl1pPr algn="r">
-              <a:defRPr sz="1071">
+              <a:defRPr sz="900">
                 <a:solidFill>
                   <a:schemeClr val="tx1">
                     <a:tint val="75000"/>
@@ -2664,27 +2666,27 @@
     </p:spTree>
     <p:extLst>
       <p:ext uri="{BB962C8B-B14F-4D97-AF65-F5344CB8AC3E}">
-        <p14:creationId xmlns:p14="http://schemas.microsoft.com/office/powerpoint/2010/main" val="768358981"/>
+        <p14:creationId xmlns:p14="http://schemas.microsoft.com/office/powerpoint/2010/main" val="155316202"/>
       </p:ext>
     </p:extLst>
   </p:cSld>
   <p:clrMap bg1="lt1" tx1="dk1" bg2="lt2" tx2="dk2" accent1="accent1" accent2="accent2" accent3="accent3" accent4="accent4" accent5="accent5" accent6="accent6" hlink="hlink" folHlink="folHlink"/>
   <p:sldLayoutIdLst>
-    <p:sldLayoutId id="2147483685" r:id="rId1"/>
-    <p:sldLayoutId id="2147483686" r:id="rId2"/>
-    <p:sldLayoutId id="2147483687" r:id="rId3"/>
-    <p:sldLayoutId id="2147483688" r:id="rId4"/>
-    <p:sldLayoutId id="2147483689" r:id="rId5"/>
-    <p:sldLayoutId id="2147483690" r:id="rId6"/>
-    <p:sldLayoutId id="2147483691" r:id="rId7"/>
-    <p:sldLayoutId id="2147483692" r:id="rId8"/>
-    <p:sldLayoutId id="2147483693" r:id="rId9"/>
-    <p:sldLayoutId id="2147483694" r:id="rId10"/>
-    <p:sldLayoutId id="2147483695" r:id="rId11"/>
+    <p:sldLayoutId id="2147483697" r:id="rId1"/>
+    <p:sldLayoutId id="2147483698" r:id="rId2"/>
+    <p:sldLayoutId id="2147483699" r:id="rId3"/>
+    <p:sldLayoutId id="2147483700" r:id="rId4"/>
+    <p:sldLayoutId id="2147483701" r:id="rId5"/>
+    <p:sldLayoutId id="2147483702" r:id="rId6"/>
+    <p:sldLayoutId id="2147483703" r:id="rId7"/>
+    <p:sldLayoutId id="2147483704" r:id="rId8"/>
+    <p:sldLayoutId id="2147483705" r:id="rId9"/>
+    <p:sldLayoutId id="2147483706" r:id="rId10"/>
+    <p:sldLayoutId id="2147483707" r:id="rId11"/>
   </p:sldLayoutIdLst>
   <p:txStyles>
     <p:titleStyle>
-      <a:lvl1pPr algn="l" defTabSz="816011" rtl="0" eaLnBrk="1" latinLnBrk="0" hangingPunct="1">
+      <a:lvl1pPr algn="l" defTabSz="685800" rtl="0" eaLnBrk="1" latinLnBrk="0" hangingPunct="1">
         <a:lnSpc>
           <a:spcPct val="90000"/>
         </a:lnSpc>
@@ -2692,7 +2694,7 @@
           <a:spcPct val="0"/>
         </a:spcBef>
         <a:buNone/>
-        <a:defRPr sz="3927" kern="1200">
+        <a:defRPr sz="3300" kern="1200">
           <a:solidFill>
             <a:schemeClr val="tx1"/>
           </a:solidFill>
@@ -2703,16 +2705,16 @@
       </a:lvl1pPr>
     </p:titleStyle>
     <p:bodyStyle>
-      <a:lvl1pPr marL="204003" indent="-204003" algn="l" defTabSz="816011" rtl="0" eaLnBrk="1" latinLnBrk="0" hangingPunct="1">
+      <a:lvl1pPr marL="171450" indent="-171450" algn="l" defTabSz="685800" rtl="0" eaLnBrk="1" latinLnBrk="0" hangingPunct="1">
         <a:lnSpc>
           <a:spcPct val="90000"/>
         </a:lnSpc>
         <a:spcBef>
-          <a:spcPts val="892"/>
+          <a:spcPts val="750"/>
         </a:spcBef>
         <a:buFont typeface="Arial" panose="020B0604020202020204" pitchFamily="34" charset="0"/>
         <a:buChar char="•"/>
-        <a:defRPr sz="2499" kern="1200">
+        <a:defRPr sz="2100" kern="1200">
           <a:solidFill>
             <a:schemeClr val="tx1"/>
           </a:solidFill>
@@ -2721,16 +2723,16 @@
           <a:cs typeface="+mn-cs"/>
         </a:defRPr>
       </a:lvl1pPr>
-      <a:lvl2pPr marL="612008" indent="-204003" algn="l" defTabSz="816011" rtl="0" eaLnBrk="1" latinLnBrk="0" hangingPunct="1">
+      <a:lvl2pPr marL="514350" indent="-171450" algn="l" defTabSz="685800" rtl="0" eaLnBrk="1" latinLnBrk="0" hangingPunct="1">
         <a:lnSpc>
           <a:spcPct val="90000"/>
         </a:lnSpc>
         <a:spcBef>
-          <a:spcPts val="446"/>
+          <a:spcPts val="375"/>
         </a:spcBef>
         <a:buFont typeface="Arial" panose="020B0604020202020204" pitchFamily="34" charset="0"/>
         <a:buChar char="•"/>
-        <a:defRPr sz="2142" kern="1200">
+        <a:defRPr sz="1800" kern="1200">
           <a:solidFill>
             <a:schemeClr val="tx1"/>
           </a:solidFill>
@@ -2739,16 +2741,16 @@
           <a:cs typeface="+mn-cs"/>
         </a:defRPr>
       </a:lvl2pPr>
-      <a:lvl3pPr marL="1020013" indent="-204003" algn="l" defTabSz="816011" rtl="0" eaLnBrk="1" latinLnBrk="0" hangingPunct="1">
+      <a:lvl3pPr marL="857250" indent="-171450" algn="l" defTabSz="685800" rtl="0" eaLnBrk="1" latinLnBrk="0" hangingPunct="1">
         <a:lnSpc>
           <a:spcPct val="90000"/>
         </a:lnSpc>
         <a:spcBef>
-          <a:spcPts val="446"/>
+          <a:spcPts val="375"/>
         </a:spcBef>
         <a:buFont typeface="Arial" panose="020B0604020202020204" pitchFamily="34" charset="0"/>
         <a:buChar char="•"/>
-        <a:defRPr sz="1785" kern="1200">
+        <a:defRPr sz="1500" kern="1200">
           <a:solidFill>
             <a:schemeClr val="tx1"/>
           </a:solidFill>
@@ -2757,16 +2759,16 @@
           <a:cs typeface="+mn-cs"/>
         </a:defRPr>
       </a:lvl3pPr>
-      <a:lvl4pPr marL="1428018" indent="-204003" algn="l" defTabSz="816011" rtl="0" eaLnBrk="1" latinLnBrk="0" hangingPunct="1">
+      <a:lvl4pPr marL="1200150" indent="-171450" algn="l" defTabSz="685800" rtl="0" eaLnBrk="1" latinLnBrk="0" hangingPunct="1">
         <a:lnSpc>
           <a:spcPct val="90000"/>
         </a:lnSpc>
         <a:spcBef>
-          <a:spcPts val="446"/>
+          <a:spcPts val="375"/>
         </a:spcBef>
         <a:buFont typeface="Arial" panose="020B0604020202020204" pitchFamily="34" charset="0"/>
         <a:buChar char="•"/>
-        <a:defRPr sz="1606" kern="1200">
+        <a:defRPr sz="1350" kern="1200">
           <a:solidFill>
             <a:schemeClr val="tx1"/>
           </a:solidFill>
@@ -2775,16 +2777,16 @@
           <a:cs typeface="+mn-cs"/>
         </a:defRPr>
       </a:lvl4pPr>
-      <a:lvl5pPr marL="1836024" indent="-204003" algn="l" defTabSz="816011" rtl="0" eaLnBrk="1" latinLnBrk="0" hangingPunct="1">
+      <a:lvl5pPr marL="1543050" indent="-171450" algn="l" defTabSz="685800" rtl="0" eaLnBrk="1" latinLnBrk="0" hangingPunct="1">
         <a:lnSpc>
           <a:spcPct val="90000"/>
         </a:lnSpc>
         <a:spcBef>
-          <a:spcPts val="446"/>
+          <a:spcPts val="375"/>
         </a:spcBef>
         <a:buFont typeface="Arial" panose="020B0604020202020204" pitchFamily="34" charset="0"/>
         <a:buChar char="•"/>
-        <a:defRPr sz="1606" kern="1200">
+        <a:defRPr sz="1350" kern="1200">
           <a:solidFill>
             <a:schemeClr val="tx1"/>
           </a:solidFill>
@@ -2793,16 +2795,16 @@
           <a:cs typeface="+mn-cs"/>
         </a:defRPr>
       </a:lvl5pPr>
-      <a:lvl6pPr marL="2244029" indent="-204003" algn="l" defTabSz="816011" rtl="0" eaLnBrk="1" latinLnBrk="0" hangingPunct="1">
+      <a:lvl6pPr marL="1885950" indent="-171450" algn="l" defTabSz="685800" rtl="0" eaLnBrk="1" latinLnBrk="0" hangingPunct="1">
         <a:lnSpc>
           <a:spcPct val="90000"/>
         </a:lnSpc>
         <a:spcBef>
-          <a:spcPts val="446"/>
+          <a:spcPts val="375"/>
         </a:spcBef>
         <a:buFont typeface="Arial" panose="020B0604020202020204" pitchFamily="34" charset="0"/>
         <a:buChar char="•"/>
-        <a:defRPr sz="1606" kern="1200">
+        <a:defRPr sz="1350" kern="1200">
           <a:solidFill>
             <a:schemeClr val="tx1"/>
           </a:solidFill>
@@ -2811,16 +2813,16 @@
           <a:cs typeface="+mn-cs"/>
         </a:defRPr>
       </a:lvl6pPr>
-      <a:lvl7pPr marL="2652034" indent="-204003" algn="l" defTabSz="816011" rtl="0" eaLnBrk="1" latinLnBrk="0" hangingPunct="1">
+      <a:lvl7pPr marL="2228850" indent="-171450" algn="l" defTabSz="685800" rtl="0" eaLnBrk="1" latinLnBrk="0" hangingPunct="1">
         <a:lnSpc>
           <a:spcPct val="90000"/>
         </a:lnSpc>
         <a:spcBef>
-          <a:spcPts val="446"/>
+          <a:spcPts val="375"/>
         </a:spcBef>
         <a:buFont typeface="Arial" panose="020B0604020202020204" pitchFamily="34" charset="0"/>
         <a:buChar char="•"/>
-        <a:defRPr sz="1606" kern="1200">
+        <a:defRPr sz="1350" kern="1200">
           <a:solidFill>
             <a:schemeClr val="tx1"/>
           </a:solidFill>
@@ -2829,16 +2831,16 @@
           <a:cs typeface="+mn-cs"/>
         </a:defRPr>
       </a:lvl7pPr>
-      <a:lvl8pPr marL="3060040" indent="-204003" algn="l" defTabSz="816011" rtl="0" eaLnBrk="1" latinLnBrk="0" hangingPunct="1">
+      <a:lvl8pPr marL="2571750" indent="-171450" algn="l" defTabSz="685800" rtl="0" eaLnBrk="1" latinLnBrk="0" hangingPunct="1">
         <a:lnSpc>
           <a:spcPct val="90000"/>
         </a:lnSpc>
         <a:spcBef>
-          <a:spcPts val="446"/>
+          <a:spcPts val="375"/>
         </a:spcBef>
         <a:buFont typeface="Arial" panose="020B0604020202020204" pitchFamily="34" charset="0"/>
         <a:buChar char="•"/>
-        <a:defRPr sz="1606" kern="1200">
+        <a:defRPr sz="1350" kern="1200">
           <a:solidFill>
             <a:schemeClr val="tx1"/>
           </a:solidFill>
@@ -2847,16 +2849,16 @@
           <a:cs typeface="+mn-cs"/>
         </a:defRPr>
       </a:lvl8pPr>
-      <a:lvl9pPr marL="3468045" indent="-204003" algn="l" defTabSz="816011" rtl="0" eaLnBrk="1" latinLnBrk="0" hangingPunct="1">
+      <a:lvl9pPr marL="2914650" indent="-171450" algn="l" defTabSz="685800" rtl="0" eaLnBrk="1" latinLnBrk="0" hangingPunct="1">
         <a:lnSpc>
           <a:spcPct val="90000"/>
         </a:lnSpc>
         <a:spcBef>
-          <a:spcPts val="446"/>
+          <a:spcPts val="375"/>
         </a:spcBef>
         <a:buFont typeface="Arial" panose="020B0604020202020204" pitchFamily="34" charset="0"/>
         <a:buChar char="•"/>
-        <a:defRPr sz="1606" kern="1200">
+        <a:defRPr sz="1350" kern="1200">
           <a:solidFill>
             <a:schemeClr val="tx1"/>
           </a:solidFill>
@@ -2870,8 +2872,8 @@
       <a:defPPr>
         <a:defRPr lang="en-US"/>
       </a:defPPr>
-      <a:lvl1pPr marL="0" algn="l" defTabSz="816011" rtl="0" eaLnBrk="1" latinLnBrk="0" hangingPunct="1">
-        <a:defRPr sz="1606" kern="1200">
+      <a:lvl1pPr marL="0" algn="l" defTabSz="685800" rtl="0" eaLnBrk="1" latinLnBrk="0" hangingPunct="1">
+        <a:defRPr sz="1350" kern="1200">
           <a:solidFill>
             <a:schemeClr val="tx1"/>
           </a:solidFill>
@@ -2880,8 +2882,8 @@
           <a:cs typeface="+mn-cs"/>
         </a:defRPr>
       </a:lvl1pPr>
-      <a:lvl2pPr marL="408005" algn="l" defTabSz="816011" rtl="0" eaLnBrk="1" latinLnBrk="0" hangingPunct="1">
-        <a:defRPr sz="1606" kern="1200">
+      <a:lvl2pPr marL="342900" algn="l" defTabSz="685800" rtl="0" eaLnBrk="1" latinLnBrk="0" hangingPunct="1">
+        <a:defRPr sz="1350" kern="1200">
           <a:solidFill>
             <a:schemeClr val="tx1"/>
           </a:solidFill>
@@ -2890,8 +2892,8 @@
           <a:cs typeface="+mn-cs"/>
         </a:defRPr>
       </a:lvl2pPr>
-      <a:lvl3pPr marL="816011" algn="l" defTabSz="816011" rtl="0" eaLnBrk="1" latinLnBrk="0" hangingPunct="1">
-        <a:defRPr sz="1606" kern="1200">
+      <a:lvl3pPr marL="685800" algn="l" defTabSz="685800" rtl="0" eaLnBrk="1" latinLnBrk="0" hangingPunct="1">
+        <a:defRPr sz="1350" kern="1200">
           <a:solidFill>
             <a:schemeClr val="tx1"/>
           </a:solidFill>
@@ -2900,8 +2902,8 @@
           <a:cs typeface="+mn-cs"/>
         </a:defRPr>
       </a:lvl3pPr>
-      <a:lvl4pPr marL="1224016" algn="l" defTabSz="816011" rtl="0" eaLnBrk="1" latinLnBrk="0" hangingPunct="1">
-        <a:defRPr sz="1606" kern="1200">
+      <a:lvl4pPr marL="1028700" algn="l" defTabSz="685800" rtl="0" eaLnBrk="1" latinLnBrk="0" hangingPunct="1">
+        <a:defRPr sz="1350" kern="1200">
           <a:solidFill>
             <a:schemeClr val="tx1"/>
           </a:solidFill>
@@ -2910,8 +2912,8 @@
           <a:cs typeface="+mn-cs"/>
         </a:defRPr>
       </a:lvl4pPr>
-      <a:lvl5pPr marL="1632021" algn="l" defTabSz="816011" rtl="0" eaLnBrk="1" latinLnBrk="0" hangingPunct="1">
-        <a:defRPr sz="1606" kern="1200">
+      <a:lvl5pPr marL="1371600" algn="l" defTabSz="685800" rtl="0" eaLnBrk="1" latinLnBrk="0" hangingPunct="1">
+        <a:defRPr sz="1350" kern="1200">
           <a:solidFill>
             <a:schemeClr val="tx1"/>
           </a:solidFill>
@@ -2920,8 +2922,8 @@
           <a:cs typeface="+mn-cs"/>
         </a:defRPr>
       </a:lvl5pPr>
-      <a:lvl6pPr marL="2040026" algn="l" defTabSz="816011" rtl="0" eaLnBrk="1" latinLnBrk="0" hangingPunct="1">
-        <a:defRPr sz="1606" kern="1200">
+      <a:lvl6pPr marL="1714500" algn="l" defTabSz="685800" rtl="0" eaLnBrk="1" latinLnBrk="0" hangingPunct="1">
+        <a:defRPr sz="1350" kern="1200">
           <a:solidFill>
             <a:schemeClr val="tx1"/>
           </a:solidFill>
@@ -2930,8 +2932,8 @@
           <a:cs typeface="+mn-cs"/>
         </a:defRPr>
       </a:lvl6pPr>
-      <a:lvl7pPr marL="2448032" algn="l" defTabSz="816011" rtl="0" eaLnBrk="1" latinLnBrk="0" hangingPunct="1">
-        <a:defRPr sz="1606" kern="1200">
+      <a:lvl7pPr marL="2057400" algn="l" defTabSz="685800" rtl="0" eaLnBrk="1" latinLnBrk="0" hangingPunct="1">
+        <a:defRPr sz="1350" kern="1200">
           <a:solidFill>
             <a:schemeClr val="tx1"/>
           </a:solidFill>
@@ -2940,8 +2942,8 @@
           <a:cs typeface="+mn-cs"/>
         </a:defRPr>
       </a:lvl7pPr>
-      <a:lvl8pPr marL="2856037" algn="l" defTabSz="816011" rtl="0" eaLnBrk="1" latinLnBrk="0" hangingPunct="1">
-        <a:defRPr sz="1606" kern="1200">
+      <a:lvl8pPr marL="2400300" algn="l" defTabSz="685800" rtl="0" eaLnBrk="1" latinLnBrk="0" hangingPunct="1">
+        <a:defRPr sz="1350" kern="1200">
           <a:solidFill>
             <a:schemeClr val="tx1"/>
           </a:solidFill>
@@ -2950,8 +2952,8 @@
           <a:cs typeface="+mn-cs"/>
         </a:defRPr>
       </a:lvl8pPr>
-      <a:lvl9pPr marL="3264042" algn="l" defTabSz="816011" rtl="0" eaLnBrk="1" latinLnBrk="0" hangingPunct="1">
-        <a:defRPr sz="1606" kern="1200">
+      <a:lvl9pPr marL="2743200" algn="l" defTabSz="685800" rtl="0" eaLnBrk="1" latinLnBrk="0" hangingPunct="1">
+        <a:defRPr sz="1350" kern="1200">
           <a:solidFill>
             <a:schemeClr val="tx1"/>
           </a:solidFill>
@@ -2990,8 +2992,8 @@
         </p:nvSpPr>
         <p:spPr>
           <a:xfrm>
-            <a:off x="250521" y="3189795"/>
-            <a:ext cx="2084995" cy="396000"/>
+            <a:off x="153086" y="3459234"/>
+            <a:ext cx="2088000" cy="396000"/>
           </a:xfrm>
           <a:prstGeom prst="roundRect">
             <a:avLst/>
@@ -3027,7 +3029,7 @@
           <a:p>
             <a:pPr algn="ctr"/>
             <a:r>
-              <a:rPr lang="de-DE" sz="3200" err="1" smtClean="0">
+              <a:rPr lang="de-DE" sz="3200" err="1">
                 <a:solidFill>
                   <a:schemeClr val="accent2"/>
                 </a:solidFill>
@@ -3050,8 +3052,8 @@
         </p:nvSpPr>
         <p:spPr>
           <a:xfrm>
-            <a:off x="250521" y="2566839"/>
-            <a:ext cx="2084994" cy="396000"/>
+            <a:off x="153086" y="2836278"/>
+            <a:ext cx="2088000" cy="396000"/>
           </a:xfrm>
           <a:prstGeom prst="roundRect">
             <a:avLst/>
@@ -3087,7 +3089,7 @@
           <a:p>
             <a:pPr algn="ctr"/>
             <a:r>
-              <a:rPr lang="de-DE" sz="3200" err="1" smtClean="0">
+              <a:rPr lang="de-DE" sz="3200" err="1">
                 <a:solidFill>
                   <a:schemeClr val="accent2"/>
                 </a:solidFill>
@@ -3110,8 +3112,8 @@
         </p:nvSpPr>
         <p:spPr>
           <a:xfrm>
-            <a:off x="4701344" y="4605734"/>
-            <a:ext cx="1980000" cy="396000"/>
+            <a:off x="4806274" y="4875173"/>
+            <a:ext cx="2088000" cy="396000"/>
           </a:xfrm>
           <a:prstGeom prst="roundRect">
             <a:avLst/>
@@ -3147,7 +3149,7 @@
           <a:p>
             <a:pPr algn="ctr"/>
             <a:r>
-              <a:rPr lang="de-DE" sz="3200" err="1" smtClean="0">
+              <a:rPr lang="de-DE" sz="3200" err="1">
                 <a:solidFill>
                   <a:schemeClr val="accent2"/>
                 </a:solidFill>
@@ -3170,16 +3172,16 @@
         </p:nvSpPr>
         <p:spPr>
           <a:xfrm>
-            <a:off x="479336" y="599302"/>
-            <a:ext cx="1980000" cy="1733519"/>
+            <a:off x="2944601" y="230795"/>
+            <a:ext cx="2900018" cy="511746"/>
           </a:xfrm>
           <a:prstGeom prst="roundRect">
             <a:avLst/>
           </a:prstGeom>
           <a:solidFill>
-            <a:schemeClr val="accent5">
-              <a:lumMod val="40000"/>
-              <a:lumOff val="60000"/>
+            <a:schemeClr val="accent4">
+              <a:lumMod val="20000"/>
+              <a:lumOff val="80000"/>
               <a:alpha val="91000"/>
             </a:schemeClr>
           </a:solidFill>
@@ -3209,51 +3211,12 @@
           <a:p>
             <a:pPr algn="ctr"/>
             <a:r>
-              <a:rPr lang="de-DE" sz="3200" smtClean="0">
-                <a:solidFill>
-                  <a:schemeClr val="tx1"/>
-                </a:solidFill>
-              </a:rPr>
-              <a:t>rdwd</a:t>
-            </a:r>
-          </a:p>
-          <a:p>
-            <a:pPr algn="ctr"/>
-            <a:r>
               <a:rPr lang="de-DE" sz="3200">
                 <a:solidFill>
                   <a:schemeClr val="tx1"/>
                 </a:solidFill>
               </a:rPr>
-              <a:t>s</a:t>
-            </a:r>
-            <a:r>
-              <a:rPr lang="de-DE" sz="3200" smtClean="0">
-                <a:solidFill>
-                  <a:schemeClr val="tx1"/>
-                </a:solidFill>
-              </a:rPr>
-              <a:t>tructure</a:t>
-            </a:r>
-          </a:p>
-          <a:p>
-            <a:pPr algn="ctr"/>
-            <a:r>
-              <a:rPr lang="de-DE" sz="1400" smtClean="0">
-                <a:solidFill>
-                  <a:schemeClr val="tx1"/>
-                </a:solidFill>
-                <a:hlinkClick r:id="rId2"/>
-              </a:rPr>
-              <a:t>github.com/brry/rdwd</a:t>
-            </a:r>
-            <a:r>
-              <a:rPr lang="de-DE" sz="1400" smtClean="0">
-                <a:solidFill>
-                  <a:schemeClr val="tx1"/>
-                </a:solidFill>
-              </a:rPr>
-              <a:t> </a:t>
+              <a:t>rdwd structure</a:t>
             </a:r>
             <a:endParaRPr lang="de-DE" sz="1400">
               <a:solidFill>
@@ -3271,8 +3234,8 @@
         </p:nvSpPr>
         <p:spPr>
           <a:xfrm>
-            <a:off x="4695690" y="4023677"/>
-            <a:ext cx="1980000" cy="396000"/>
+            <a:off x="4800620" y="4293116"/>
+            <a:ext cx="2088000" cy="396000"/>
           </a:xfrm>
           <a:prstGeom prst="roundRect">
             <a:avLst/>
@@ -3308,7 +3271,7 @@
           <a:p>
             <a:pPr algn="ctr"/>
             <a:r>
-              <a:rPr lang="de-DE" sz="3200" smtClean="0">
+              <a:rPr lang="de-DE" sz="3200">
                 <a:solidFill>
                   <a:schemeClr val="accent5"/>
                 </a:solidFill>
@@ -3331,8 +3294,8 @@
         </p:nvSpPr>
         <p:spPr>
           <a:xfrm>
-            <a:off x="2583156" y="2566839"/>
-            <a:ext cx="1870548" cy="396000"/>
+            <a:off x="2500085" y="2839464"/>
+            <a:ext cx="2088000" cy="396000"/>
           </a:xfrm>
           <a:prstGeom prst="roundRect">
             <a:avLst/>
@@ -3368,16 +3331,22 @@
           <a:p>
             <a:pPr algn="ctr"/>
             <a:r>
-              <a:rPr lang="de-DE" sz="3200" err="1" smtClean="0">
+              <a:rPr lang="de-DE" sz="3200" err="1">
                 <a:solidFill>
-                  <a:schemeClr val="accent2"/>
+                  <a:schemeClr val="accent6">
+                    <a:lumMod val="60000"/>
+                    <a:lumOff val="40000"/>
+                  </a:schemeClr>
                 </a:solidFill>
               </a:rPr>
               <a:t>fileIndex</a:t>
             </a:r>
             <a:endParaRPr lang="de-DE" sz="3200">
               <a:solidFill>
-                <a:schemeClr val="accent2"/>
+                <a:schemeClr val="accent6">
+                  <a:lumMod val="60000"/>
+                  <a:lumOff val="40000"/>
+                </a:schemeClr>
               </a:solidFill>
             </a:endParaRPr>
           </a:p>
@@ -3391,8 +3360,8 @@
         </p:nvSpPr>
         <p:spPr>
           <a:xfrm>
-            <a:off x="2583156" y="3195065"/>
-            <a:ext cx="1870548" cy="396000"/>
+            <a:off x="2500085" y="3467690"/>
+            <a:ext cx="2088000" cy="396000"/>
           </a:xfrm>
           <a:prstGeom prst="roundRect">
             <a:avLst/>
@@ -3428,16 +3397,22 @@
           <a:p>
             <a:pPr algn="ctr"/>
             <a:r>
-              <a:rPr lang="de-DE" sz="3200" err="1" smtClean="0">
+              <a:rPr lang="de-DE" sz="3200" err="1">
                 <a:solidFill>
-                  <a:schemeClr val="accent2"/>
+                  <a:schemeClr val="accent6">
+                    <a:lumMod val="60000"/>
+                    <a:lumOff val="40000"/>
+                  </a:schemeClr>
                 </a:solidFill>
               </a:rPr>
               <a:t>metaIndex</a:t>
             </a:r>
             <a:endParaRPr lang="de-DE" sz="3200">
               <a:solidFill>
-                <a:schemeClr val="accent2"/>
+                <a:schemeClr val="accent6">
+                  <a:lumMod val="60000"/>
+                  <a:lumOff val="40000"/>
+                </a:schemeClr>
               </a:solidFill>
             </a:endParaRPr>
           </a:p>
@@ -3454,13 +3429,18 @@
         </p:nvCxnSpPr>
         <p:spPr>
           <a:xfrm>
-            <a:off x="2335516" y="3387795"/>
-            <a:ext cx="247640" cy="5270"/>
+            <a:off x="2241090" y="3657234"/>
+            <a:ext cx="258999" cy="8456"/>
           </a:xfrm>
           <a:prstGeom prst="straightConnector1">
             <a:avLst/>
           </a:prstGeom>
           <a:ln>
+            <a:solidFill>
+              <a:schemeClr val="bg1">
+                <a:lumMod val="50000"/>
+              </a:schemeClr>
+            </a:solidFill>
             <a:tailEnd type="triangle"/>
           </a:ln>
         </p:spPr>
@@ -3490,13 +3470,18 @@
         </p:nvCxnSpPr>
         <p:spPr>
           <a:xfrm flipV="1">
-            <a:off x="2335516" y="2764839"/>
-            <a:ext cx="247640" cy="622956"/>
+            <a:off x="2241090" y="3037464"/>
+            <a:ext cx="258999" cy="619770"/>
           </a:xfrm>
           <a:prstGeom prst="straightConnector1">
             <a:avLst/>
           </a:prstGeom>
           <a:ln>
+            <a:solidFill>
+              <a:schemeClr val="bg1">
+                <a:lumMod val="50000"/>
+              </a:schemeClr>
+            </a:solidFill>
             <a:tailEnd type="triangle"/>
           </a:ln>
         </p:spPr>
@@ -3523,8 +3508,8 @@
         </p:nvSpPr>
         <p:spPr>
           <a:xfrm>
-            <a:off x="4701344" y="2878317"/>
-            <a:ext cx="1980000" cy="396000"/>
+            <a:off x="4806274" y="3147756"/>
+            <a:ext cx="2088000" cy="396000"/>
           </a:xfrm>
           <a:prstGeom prst="roundRect">
             <a:avLst/>
@@ -3560,7 +3545,7 @@
           <a:p>
             <a:pPr algn="ctr"/>
             <a:r>
-              <a:rPr lang="de-DE" sz="3200" smtClean="0">
+              <a:rPr lang="de-DE" sz="3200">
                 <a:solidFill>
                   <a:schemeClr val="accent5"/>
                 </a:solidFill>
@@ -3586,13 +3571,18 @@
         </p:nvCxnSpPr>
         <p:spPr>
           <a:xfrm>
-            <a:off x="1293018" y="2962839"/>
-            <a:ext cx="1" cy="226956"/>
+            <a:off x="1197086" y="3232278"/>
+            <a:ext cx="0" cy="226956"/>
           </a:xfrm>
           <a:prstGeom prst="straightConnector1">
             <a:avLst/>
           </a:prstGeom>
           <a:ln>
+            <a:solidFill>
+              <a:schemeClr val="bg1">
+                <a:lumMod val="50000"/>
+              </a:schemeClr>
+            </a:solidFill>
             <a:tailEnd type="triangle"/>
           </a:ln>
         </p:spPr>
@@ -3622,13 +3612,18 @@
         </p:nvCxnSpPr>
         <p:spPr>
           <a:xfrm flipV="1">
-            <a:off x="4453704" y="3076317"/>
-            <a:ext cx="247640" cy="316748"/>
+            <a:off x="4588089" y="3345756"/>
+            <a:ext cx="218189" cy="319934"/>
           </a:xfrm>
           <a:prstGeom prst="straightConnector1">
             <a:avLst/>
           </a:prstGeom>
           <a:ln>
+            <a:solidFill>
+              <a:schemeClr val="bg1">
+                <a:lumMod val="50000"/>
+              </a:schemeClr>
+            </a:solidFill>
             <a:tailEnd type="triangle"/>
           </a:ln>
         </p:spPr>
@@ -3658,13 +3653,18 @@
         </p:nvCxnSpPr>
         <p:spPr>
           <a:xfrm>
-            <a:off x="4453704" y="2764839"/>
-            <a:ext cx="247640" cy="311478"/>
+            <a:off x="4588089" y="3037464"/>
+            <a:ext cx="218189" cy="308292"/>
           </a:xfrm>
           <a:prstGeom prst="straightConnector1">
             <a:avLst/>
           </a:prstGeom>
           <a:ln>
+            <a:solidFill>
+              <a:schemeClr val="bg1">
+                <a:lumMod val="50000"/>
+              </a:schemeClr>
+            </a:solidFill>
             <a:tailEnd type="triangle"/>
           </a:ln>
         </p:spPr>
@@ -3694,13 +3694,18 @@
         </p:nvCxnSpPr>
         <p:spPr>
           <a:xfrm>
-            <a:off x="5685690" y="4419677"/>
+            <a:off x="5844620" y="4689120"/>
             <a:ext cx="5654" cy="186057"/>
           </a:xfrm>
           <a:prstGeom prst="straightConnector1">
             <a:avLst/>
           </a:prstGeom>
           <a:ln>
+            <a:solidFill>
+              <a:schemeClr val="bg1">
+                <a:lumMod val="50000"/>
+              </a:schemeClr>
+            </a:solidFill>
             <a:tailEnd type="triangle"/>
           </a:ln>
         </p:spPr>
@@ -3727,7 +3732,7 @@
         </p:nvSpPr>
         <p:spPr>
           <a:xfrm>
-            <a:off x="4907779" y="599302"/>
+            <a:off x="5066711" y="1152967"/>
             <a:ext cx="1555823" cy="1754326"/>
           </a:xfrm>
           <a:prstGeom prst="rect">
@@ -3735,10 +3740,7 @@
           </a:prstGeom>
           <a:ln>
             <a:solidFill>
-              <a:schemeClr val="accent1">
-                <a:lumMod val="40000"/>
-                <a:lumOff val="60000"/>
-              </a:schemeClr>
+              <a:schemeClr val="bg2"/>
             </a:solidFill>
           </a:ln>
         </p:spPr>
@@ -3753,18 +3755,18 @@
               <a:t>i</a:t>
             </a:r>
             <a:r>
-              <a:rPr lang="de-DE" b="1" smtClean="0"/>
+              <a:rPr lang="de-DE" b="1"/>
               <a:t>d</a:t>
             </a:r>
             <a:r>
-              <a:rPr lang="de-DE" smtClean="0"/>
+              <a:rPr lang="de-DE"/>
               <a:t> / name,</a:t>
             </a:r>
             <a:endParaRPr lang="de-DE"/>
           </a:p>
           <a:p>
             <a:r>
-              <a:rPr lang="de-DE" smtClean="0"/>
+              <a:rPr lang="de-DE"/>
               <a:t>base,</a:t>
             </a:r>
             <a:endParaRPr lang="de-DE"/>
@@ -3775,18 +3777,18 @@
               <a:t>res, var, </a:t>
             </a:r>
             <a:r>
-              <a:rPr lang="de-DE" b="1" smtClean="0"/>
+              <a:rPr lang="de-DE" b="1"/>
               <a:t>per</a:t>
             </a:r>
             <a:r>
-              <a:rPr lang="de-DE" smtClean="0"/>
+              <a:rPr lang="de-DE"/>
               <a:t>,</a:t>
             </a:r>
             <a:endParaRPr lang="de-DE"/>
           </a:p>
           <a:p>
             <a:r>
-              <a:rPr lang="de-DE" smtClean="0"/>
+              <a:rPr lang="de-DE"/>
               <a:t>findex,</a:t>
             </a:r>
           </a:p>
@@ -3796,13 +3798,13 @@
               <a:t>c</a:t>
             </a:r>
             <a:r>
-              <a:rPr lang="de-DE" smtClean="0"/>
+              <a:rPr lang="de-DE"/>
               <a:t>urrent,</a:t>
             </a:r>
           </a:p>
           <a:p>
             <a:r>
-              <a:rPr lang="de-DE" b="1" smtClean="0"/>
+              <a:rPr lang="de-DE" b="1"/>
               <a:t>meta?</a:t>
             </a:r>
             <a:endParaRPr lang="de-DE" b="1"/>
@@ -3820,13 +3822,18 @@
         </p:nvCxnSpPr>
         <p:spPr>
           <a:xfrm>
-            <a:off x="5685691" y="2353628"/>
-            <a:ext cx="5653" cy="524689"/>
+            <a:off x="5844623" y="2907295"/>
+            <a:ext cx="5653" cy="240463"/>
           </a:xfrm>
           <a:prstGeom prst="straightConnector1">
             <a:avLst/>
           </a:prstGeom>
           <a:ln>
+            <a:solidFill>
+              <a:schemeClr val="bg1">
+                <a:lumMod val="50000"/>
+              </a:schemeClr>
+            </a:solidFill>
             <a:tailEnd type="triangle"/>
           </a:ln>
         </p:spPr>
@@ -3853,7 +3860,7 @@
         </p:nvSpPr>
         <p:spPr>
           <a:xfrm>
-            <a:off x="5685689" y="3465926"/>
+            <a:off x="5850580" y="3735366"/>
             <a:ext cx="1261884" cy="369332"/>
           </a:xfrm>
           <a:prstGeom prst="rect">
@@ -3861,10 +3868,7 @@
           </a:prstGeom>
           <a:ln>
             <a:solidFill>
-              <a:schemeClr val="accent1">
-                <a:lumMod val="40000"/>
-                <a:lumOff val="60000"/>
-              </a:schemeClr>
+              <a:schemeClr val="bg2"/>
             </a:solidFill>
           </a:ln>
         </p:spPr>
@@ -3881,42 +3885,6 @@
           </a:p>
         </p:txBody>
       </p:sp>
-      <p:cxnSp>
-        <p:nvCxnSpPr>
-          <p:cNvPr id="71" name="Gerade Verbindung mit Pfeil 70"/>
-          <p:cNvCxnSpPr>
-            <a:stCxn id="28" idx="2"/>
-            <a:endCxn id="14" idx="0"/>
-          </p:cNvCxnSpPr>
-          <p:nvPr/>
-        </p:nvCxnSpPr>
-        <p:spPr>
-          <a:xfrm flipH="1">
-            <a:off x="5685690" y="3274317"/>
-            <a:ext cx="5654" cy="749360"/>
-          </a:xfrm>
-          <a:prstGeom prst="straightConnector1">
-            <a:avLst/>
-          </a:prstGeom>
-          <a:ln>
-            <a:tailEnd type="triangle"/>
-          </a:ln>
-        </p:spPr>
-        <p:style>
-          <a:lnRef idx="1">
-            <a:schemeClr val="accent1"/>
-          </a:lnRef>
-          <a:fillRef idx="0">
-            <a:schemeClr val="accent1"/>
-          </a:fillRef>
-          <a:effectRef idx="0">
-            <a:schemeClr val="accent1"/>
-          </a:effectRef>
-          <a:fontRef idx="minor">
-            <a:schemeClr val="tx1"/>
-          </a:fontRef>
-        </p:style>
-      </p:cxnSp>
       <p:sp>
         <p:nvSpPr>
           <p:cNvPr id="74" name="Rechteck 73"/>
@@ -3925,7 +3893,7 @@
         </p:nvSpPr>
         <p:spPr>
           <a:xfrm>
-            <a:off x="6947573" y="3048832"/>
+            <a:off x="7112463" y="3318274"/>
             <a:ext cx="1829166" cy="1200329"/>
           </a:xfrm>
           <a:prstGeom prst="rect">
@@ -3933,10 +3901,7 @@
           </a:prstGeom>
           <a:ln>
             <a:solidFill>
-              <a:schemeClr val="accent1">
-                <a:lumMod val="40000"/>
-                <a:lumOff val="60000"/>
-              </a:schemeClr>
+              <a:schemeClr val="bg2"/>
             </a:solidFill>
           </a:ln>
         </p:spPr>
@@ -3951,22 +3916,14 @@
               <a:t>dir, </a:t>
             </a:r>
             <a:r>
-              <a:rPr lang="de-DE" smtClean="0"/>
-              <a:t>force</a:t>
-            </a:r>
-            <a:r>
-              <a:rPr lang="de-DE" smtClean="0"/>
-              <a:t>?,</a:t>
-            </a:r>
-          </a:p>
-          <a:p>
-            <a:r>
-              <a:rPr lang="de-DE" smtClean="0"/>
-              <a:t>sleep</a:t>
-            </a:r>
-            <a:r>
-              <a:rPr lang="de-DE" smtClean="0"/>
-              <a:t>, quiet?,</a:t>
+              <a:rPr lang="de-DE"/>
+              <a:t>force?,</a:t>
+            </a:r>
+          </a:p>
+          <a:p>
+            <a:r>
+              <a:rPr lang="de-DE"/>
+              <a:t>sleep, quiet?,</a:t>
             </a:r>
             <a:endParaRPr lang="de-DE"/>
           </a:p>
@@ -3976,7 +3933,7 @@
               <a:t>progbar</a:t>
             </a:r>
             <a:r>
-              <a:rPr lang="de-DE" smtClean="0"/>
+              <a:rPr lang="de-DE"/>
               <a:t>?, ntrunc, browse?, read?</a:t>
             </a:r>
             <a:endParaRPr lang="de-DE"/>
@@ -3991,8 +3948,8 @@
         </p:nvSpPr>
         <p:spPr>
           <a:xfrm>
-            <a:off x="2583157" y="3819813"/>
-            <a:ext cx="1870548" cy="396000"/>
+            <a:off x="2500086" y="4092438"/>
+            <a:ext cx="2088000" cy="396000"/>
           </a:xfrm>
           <a:prstGeom prst="roundRect">
             <a:avLst/>
@@ -4028,16 +3985,22 @@
           <a:p>
             <a:pPr algn="ctr"/>
             <a:r>
-              <a:rPr lang="de-DE" sz="3200" smtClean="0">
+              <a:rPr lang="de-DE" sz="3200">
                 <a:solidFill>
-                  <a:schemeClr val="accent2"/>
+                  <a:schemeClr val="accent6">
+                    <a:lumMod val="60000"/>
+                    <a:lumOff val="40000"/>
+                  </a:schemeClr>
                 </a:solidFill>
               </a:rPr>
               <a:t>geoIndex</a:t>
             </a:r>
             <a:endParaRPr lang="de-DE" sz="3200">
               <a:solidFill>
-                <a:schemeClr val="accent2"/>
+                <a:schemeClr val="accent6">
+                  <a:lumMod val="60000"/>
+                  <a:lumOff val="40000"/>
+                </a:schemeClr>
               </a:solidFill>
             </a:endParaRPr>
           </a:p>
@@ -4051,7 +4014,7 @@
         </p:nvSpPr>
         <p:spPr>
           <a:xfrm>
-            <a:off x="3286284" y="587524"/>
+            <a:off x="3286288" y="1140297"/>
             <a:ext cx="1445269" cy="396000"/>
           </a:xfrm>
           <a:prstGeom prst="roundRect">
@@ -4088,7 +4051,7 @@
           <a:p>
             <a:pPr algn="ctr"/>
             <a:r>
-              <a:rPr lang="de-DE" sz="3200" smtClean="0">
+              <a:rPr lang="de-DE" sz="3200">
                 <a:solidFill>
                   <a:schemeClr val="accent2"/>
                 </a:solidFill>
@@ -4111,7 +4074,7 @@
         </p:nvSpPr>
         <p:spPr>
           <a:xfrm>
-            <a:off x="3286284" y="1187688"/>
+            <a:off x="3286288" y="1740462"/>
             <a:ext cx="1445269" cy="923330"/>
           </a:xfrm>
           <a:prstGeom prst="rect">
@@ -4119,10 +4082,7 @@
           </a:prstGeom>
           <a:ln>
             <a:solidFill>
-              <a:schemeClr val="accent1">
-                <a:lumMod val="40000"/>
-                <a:lumOff val="60000"/>
-              </a:schemeClr>
+              <a:schemeClr val="bg2"/>
             </a:solidFill>
           </a:ln>
         </p:spPr>
@@ -4133,23 +4093,23 @@
           <a:lstStyle/>
           <a:p>
             <a:r>
-              <a:rPr lang="de-DE" b="1" smtClean="0"/>
+              <a:rPr lang="de-DE" b="1"/>
               <a:t>name</a:t>
             </a:r>
             <a:r>
-              <a:rPr lang="de-DE" smtClean="0"/>
+              <a:rPr lang="de-DE"/>
               <a:t>,</a:t>
             </a:r>
           </a:p>
           <a:p>
             <a:r>
-              <a:rPr lang="de-DE" smtClean="0"/>
+              <a:rPr lang="de-DE"/>
               <a:t>exactmatch?,</a:t>
             </a:r>
           </a:p>
           <a:p>
             <a:r>
-              <a:rPr lang="de-DE" smtClean="0"/>
+              <a:rPr lang="de-DE"/>
               <a:t>mindex</a:t>
             </a:r>
             <a:endParaRPr lang="de-DE"/>
@@ -4167,13 +4127,18 @@
         </p:nvCxnSpPr>
         <p:spPr>
           <a:xfrm flipV="1">
-            <a:off x="4008919" y="983524"/>
-            <a:ext cx="0" cy="204164"/>
+            <a:off x="4008921" y="1536299"/>
+            <a:ext cx="0" cy="204165"/>
           </a:xfrm>
           <a:prstGeom prst="straightConnector1">
             <a:avLst/>
           </a:prstGeom>
           <a:ln>
+            <a:solidFill>
+              <a:schemeClr val="bg1">
+                <a:lumMod val="50000"/>
+              </a:schemeClr>
+            </a:solidFill>
             <a:tailEnd type="triangle"/>
           </a:ln>
         </p:spPr>
@@ -4200,18 +4165,15 @@
         </p:nvSpPr>
         <p:spPr>
           <a:xfrm>
-            <a:off x="4731553" y="5009240"/>
-            <a:ext cx="1919581" cy="646331"/>
+            <a:off x="7112463" y="4750011"/>
+            <a:ext cx="1829166" cy="646331"/>
           </a:xfrm>
           <a:prstGeom prst="rect">
             <a:avLst/>
           </a:prstGeom>
           <a:ln>
             <a:solidFill>
-              <a:schemeClr val="accent1">
-                <a:lumMod val="40000"/>
-                <a:lumOff val="60000"/>
-              </a:schemeClr>
+              <a:schemeClr val="bg2"/>
             </a:solidFill>
           </a:ln>
         </p:spPr>
@@ -4222,17 +4184,17 @@
           <a:lstStyle/>
           <a:p>
             <a:r>
-              <a:rPr lang="de-DE" b="1" smtClean="0"/>
+              <a:rPr lang="de-DE" b="1"/>
               <a:t>file</a:t>
             </a:r>
             <a:r>
-              <a:rPr lang="de-DE" smtClean="0"/>
+              <a:rPr lang="de-DE"/>
               <a:t>, dir, </a:t>
             </a:r>
           </a:p>
           <a:p>
             <a:r>
-              <a:rPr lang="de-DE" smtClean="0"/>
+              <a:rPr lang="de-DE"/>
               <a:t>meta?, format, tz</a:t>
             </a:r>
             <a:endParaRPr lang="de-DE"/>
@@ -4250,13 +4212,18 @@
         </p:nvCxnSpPr>
         <p:spPr>
           <a:xfrm>
-            <a:off x="2335516" y="3387795"/>
-            <a:ext cx="247641" cy="630018"/>
+            <a:off x="2241086" y="3657234"/>
+            <a:ext cx="259000" cy="633204"/>
           </a:xfrm>
           <a:prstGeom prst="straightConnector1">
             <a:avLst/>
           </a:prstGeom>
           <a:ln>
+            <a:solidFill>
+              <a:schemeClr val="bg1">
+                <a:lumMod val="50000"/>
+              </a:schemeClr>
+            </a:solidFill>
             <a:tailEnd type="triangle"/>
           </a:ln>
         </p:spPr>
@@ -4283,7 +4250,7 @@
         </p:nvSpPr>
         <p:spPr>
           <a:xfrm>
-            <a:off x="6947573" y="1289059"/>
+            <a:off x="7112463" y="1582359"/>
             <a:ext cx="1829166" cy="1065205"/>
           </a:xfrm>
           <a:prstGeom prst="roundRect">
@@ -4320,7 +4287,7 @@
           <a:p>
             <a:pPr algn="ctr"/>
             <a:r>
-              <a:rPr lang="de-DE" sz="3200" smtClean="0">
+              <a:rPr lang="de-DE" sz="3200">
                 <a:solidFill>
                   <a:schemeClr val="accent2"/>
                 </a:solidFill>
@@ -4331,7 +4298,7 @@
           <a:p>
             <a:pPr algn="ctr"/>
             <a:r>
-              <a:rPr lang="de-DE" sz="3200" smtClean="0">
+              <a:rPr lang="de-DE" sz="3200">
                 <a:solidFill>
                   <a:schemeClr val="accent2"/>
                 </a:solidFill>
@@ -4357,13 +4324,18 @@
         </p:nvCxnSpPr>
         <p:spPr>
           <a:xfrm>
-            <a:off x="7862156" y="2354264"/>
-            <a:ext cx="0" cy="694568"/>
+            <a:off x="8027046" y="2647562"/>
+            <a:ext cx="0" cy="670710"/>
           </a:xfrm>
           <a:prstGeom prst="straightConnector1">
             <a:avLst/>
           </a:prstGeom>
           <a:ln>
+            <a:solidFill>
+              <a:schemeClr val="bg1">
+                <a:lumMod val="50000"/>
+              </a:schemeClr>
+            </a:solidFill>
             <a:tailEnd type="triangle"/>
           </a:ln>
         </p:spPr>
@@ -4391,14 +4363,19 @@
           <p:nvPr/>
         </p:nvCxnSpPr>
         <p:spPr>
-          <a:xfrm>
-            <a:off x="4731553" y="785524"/>
-            <a:ext cx="247640" cy="5051"/>
+          <a:xfrm flipV="1">
+            <a:off x="4731553" y="1332841"/>
+            <a:ext cx="423012" cy="5456"/>
           </a:xfrm>
           <a:prstGeom prst="straightConnector1">
             <a:avLst/>
           </a:prstGeom>
           <a:ln>
+            <a:solidFill>
+              <a:schemeClr val="bg1">
+                <a:lumMod val="50000"/>
+              </a:schemeClr>
+            </a:solidFill>
             <a:tailEnd type="triangle"/>
           </a:ln>
         </p:spPr>
@@ -4417,6 +4394,669 @@
           </a:fontRef>
         </p:style>
       </p:cxnSp>
+      <p:sp>
+        <p:nvSpPr>
+          <p:cNvPr id="32" name="Abgerundetes Rechteck 31"/>
+          <p:cNvSpPr/>
+          <p:nvPr/>
+        </p:nvSpPr>
+        <p:spPr>
+          <a:xfrm>
+            <a:off x="2500085" y="4725040"/>
+            <a:ext cx="2088000" cy="396000"/>
+          </a:xfrm>
+          <a:prstGeom prst="roundRect">
+            <a:avLst/>
+          </a:prstGeom>
+          <a:solidFill>
+            <a:schemeClr val="bg2">
+              <a:alpha val="91000"/>
+            </a:schemeClr>
+          </a:solidFill>
+          <a:ln>
+            <a:noFill/>
+          </a:ln>
+        </p:spPr>
+        <p:style>
+          <a:lnRef idx="2">
+            <a:schemeClr val="accent1">
+              <a:shade val="50000"/>
+            </a:schemeClr>
+          </a:lnRef>
+          <a:fillRef idx="1">
+            <a:schemeClr val="accent1"/>
+          </a:fillRef>
+          <a:effectRef idx="0">
+            <a:schemeClr val="accent1"/>
+          </a:effectRef>
+          <a:fontRef idx="minor">
+            <a:schemeClr val="lt1"/>
+          </a:fontRef>
+        </p:style>
+        <p:txBody>
+          <a:bodyPr lIns="36000" tIns="36000" rIns="36000" bIns="36000" rtlCol="0" anchor="ctr"/>
+          <a:lstStyle/>
+          <a:p>
+            <a:pPr algn="ctr"/>
+            <a:r>
+              <a:rPr lang="de-DE" sz="3200">
+                <a:solidFill>
+                  <a:schemeClr val="accent6">
+                    <a:lumMod val="60000"/>
+                    <a:lumOff val="40000"/>
+                  </a:schemeClr>
+                </a:solidFill>
+              </a:rPr>
+              <a:t>mapDWD</a:t>
+            </a:r>
+            <a:endParaRPr lang="de-DE" sz="3200">
+              <a:solidFill>
+                <a:schemeClr val="accent6">
+                  <a:lumMod val="60000"/>
+                  <a:lumOff val="40000"/>
+                </a:schemeClr>
+              </a:solidFill>
+            </a:endParaRPr>
+          </a:p>
+        </p:txBody>
+      </p:sp>
+      <p:cxnSp>
+        <p:nvCxnSpPr>
+          <p:cNvPr id="33" name="Gerade Verbindung mit Pfeil 32"/>
+          <p:cNvCxnSpPr>
+            <a:stCxn id="45" idx="2"/>
+            <a:endCxn id="32" idx="0"/>
+          </p:cNvCxnSpPr>
+          <p:nvPr/>
+        </p:nvCxnSpPr>
+        <p:spPr>
+          <a:xfrm flipH="1">
+            <a:off x="3544089" y="4488438"/>
+            <a:ext cx="1" cy="236602"/>
+          </a:xfrm>
+          <a:prstGeom prst="straightConnector1">
+            <a:avLst/>
+          </a:prstGeom>
+          <a:ln>
+            <a:solidFill>
+              <a:schemeClr val="bg1">
+                <a:lumMod val="50000"/>
+              </a:schemeClr>
+            </a:solidFill>
+            <a:tailEnd type="triangle"/>
+          </a:ln>
+        </p:spPr>
+        <p:style>
+          <a:lnRef idx="1">
+            <a:schemeClr val="accent2"/>
+          </a:lnRef>
+          <a:fillRef idx="0">
+            <a:schemeClr val="accent2"/>
+          </a:fillRef>
+          <a:effectRef idx="0">
+            <a:schemeClr val="accent2"/>
+          </a:effectRef>
+          <a:fontRef idx="minor">
+            <a:schemeClr val="tx1"/>
+          </a:fontRef>
+        </p:style>
+      </p:cxnSp>
+      <p:sp>
+        <p:nvSpPr>
+          <p:cNvPr id="34" name="Abgerundetes Rechteck 33"/>
+          <p:cNvSpPr/>
+          <p:nvPr/>
+        </p:nvSpPr>
+        <p:spPr>
+          <a:xfrm>
+            <a:off x="153086" y="4721854"/>
+            <a:ext cx="2088000" cy="396000"/>
+          </a:xfrm>
+          <a:prstGeom prst="roundRect">
+            <a:avLst/>
+          </a:prstGeom>
+          <a:solidFill>
+            <a:schemeClr val="bg2">
+              <a:alpha val="91000"/>
+            </a:schemeClr>
+          </a:solidFill>
+          <a:ln>
+            <a:noFill/>
+          </a:ln>
+        </p:spPr>
+        <p:style>
+          <a:lnRef idx="2">
+            <a:schemeClr val="accent1">
+              <a:shade val="50000"/>
+            </a:schemeClr>
+          </a:lnRef>
+          <a:fillRef idx="1">
+            <a:schemeClr val="accent1"/>
+          </a:fillRef>
+          <a:effectRef idx="0">
+            <a:schemeClr val="accent1"/>
+          </a:effectRef>
+          <a:fontRef idx="minor">
+            <a:schemeClr val="lt1"/>
+          </a:fontRef>
+        </p:style>
+        <p:txBody>
+          <a:bodyPr lIns="36000" tIns="36000" rIns="36000" bIns="36000" rtlCol="0" anchor="ctr"/>
+          <a:lstStyle/>
+          <a:p>
+            <a:pPr algn="ctr"/>
+            <a:r>
+              <a:rPr lang="de-DE" sz="3200">
+                <a:solidFill>
+                  <a:schemeClr val="accent2"/>
+                </a:solidFill>
+              </a:rPr>
+              <a:t>metaInfo</a:t>
+            </a:r>
+            <a:endParaRPr lang="de-DE" sz="3200">
+              <a:solidFill>
+                <a:schemeClr val="accent2"/>
+              </a:solidFill>
+            </a:endParaRPr>
+          </a:p>
+        </p:txBody>
+      </p:sp>
+      <p:cxnSp>
+        <p:nvCxnSpPr>
+          <p:cNvPr id="35" name="Gerade Verbindung mit Pfeil 34"/>
+          <p:cNvCxnSpPr>
+            <a:stCxn id="34" idx="3"/>
+            <a:endCxn id="32" idx="1"/>
+          </p:cNvCxnSpPr>
+          <p:nvPr/>
+        </p:nvCxnSpPr>
+        <p:spPr>
+          <a:xfrm>
+            <a:off x="2241090" y="4919854"/>
+            <a:ext cx="258999" cy="3186"/>
+          </a:xfrm>
+          <a:prstGeom prst="straightConnector1">
+            <a:avLst/>
+          </a:prstGeom>
+          <a:ln>
+            <a:solidFill>
+              <a:schemeClr val="bg1">
+                <a:lumMod val="50000"/>
+              </a:schemeClr>
+            </a:solidFill>
+            <a:tailEnd type="triangle"/>
+          </a:ln>
+        </p:spPr>
+        <p:style>
+          <a:lnRef idx="1">
+            <a:schemeClr val="accent2"/>
+          </a:lnRef>
+          <a:fillRef idx="0">
+            <a:schemeClr val="accent2"/>
+          </a:fillRef>
+          <a:effectRef idx="0">
+            <a:schemeClr val="accent2"/>
+          </a:effectRef>
+          <a:fontRef idx="minor">
+            <a:schemeClr val="tx1"/>
+          </a:fontRef>
+        </p:style>
+      </p:cxnSp>
+      <p:cxnSp>
+        <p:nvCxnSpPr>
+          <p:cNvPr id="71" name="Gerade Verbindung mit Pfeil 70"/>
+          <p:cNvCxnSpPr>
+            <a:stCxn id="28" idx="2"/>
+            <a:endCxn id="14" idx="0"/>
+          </p:cNvCxnSpPr>
+          <p:nvPr/>
+        </p:nvCxnSpPr>
+        <p:spPr>
+          <a:xfrm flipH="1">
+            <a:off x="5844620" y="3543756"/>
+            <a:ext cx="5654" cy="749360"/>
+          </a:xfrm>
+          <a:prstGeom prst="straightConnector1">
+            <a:avLst/>
+          </a:prstGeom>
+          <a:ln>
+            <a:solidFill>
+              <a:schemeClr val="bg1">
+                <a:lumMod val="50000"/>
+              </a:schemeClr>
+            </a:solidFill>
+            <a:tailEnd type="triangle"/>
+          </a:ln>
+        </p:spPr>
+        <p:style>
+          <a:lnRef idx="1">
+            <a:schemeClr val="accent1"/>
+          </a:lnRef>
+          <a:fillRef idx="0">
+            <a:schemeClr val="accent1"/>
+          </a:fillRef>
+          <a:effectRef idx="0">
+            <a:schemeClr val="accent1"/>
+          </a:effectRef>
+          <a:fontRef idx="minor">
+            <a:schemeClr val="tx1"/>
+          </a:fontRef>
+        </p:style>
+      </p:cxnSp>
+      <p:cxnSp>
+        <p:nvCxnSpPr>
+          <p:cNvPr id="37" name="Gerade Verbindung mit Pfeil 36"/>
+          <p:cNvCxnSpPr>
+            <a:stCxn id="93" idx="1"/>
+            <a:endCxn id="12" idx="3"/>
+          </p:cNvCxnSpPr>
+          <p:nvPr/>
+        </p:nvCxnSpPr>
+        <p:spPr>
+          <a:xfrm flipH="1">
+            <a:off x="6894275" y="5073173"/>
+            <a:ext cx="218189" cy="0"/>
+          </a:xfrm>
+          <a:prstGeom prst="straightConnector1">
+            <a:avLst/>
+          </a:prstGeom>
+          <a:ln>
+            <a:solidFill>
+              <a:schemeClr val="bg1">
+                <a:lumMod val="50000"/>
+              </a:schemeClr>
+            </a:solidFill>
+            <a:tailEnd type="triangle"/>
+          </a:ln>
+        </p:spPr>
+        <p:style>
+          <a:lnRef idx="1">
+            <a:schemeClr val="accent2"/>
+          </a:lnRef>
+          <a:fillRef idx="0">
+            <a:schemeClr val="accent2"/>
+          </a:fillRef>
+          <a:effectRef idx="0">
+            <a:schemeClr val="accent2"/>
+          </a:effectRef>
+          <a:fontRef idx="minor">
+            <a:schemeClr val="tx1"/>
+          </a:fontRef>
+        </p:style>
+      </p:cxnSp>
+      <p:grpSp>
+        <p:nvGrpSpPr>
+          <p:cNvPr id="64" name="Gruppieren 63"/>
+          <p:cNvGrpSpPr/>
+          <p:nvPr/>
+        </p:nvGrpSpPr>
+        <p:grpSpPr>
+          <a:xfrm>
+            <a:off x="153086" y="220460"/>
+            <a:ext cx="2147964" cy="2053659"/>
+            <a:chOff x="168018" y="359757"/>
+            <a:chExt cx="2147964" cy="2053659"/>
+          </a:xfrm>
+        </p:grpSpPr>
+        <p:sp>
+          <p:nvSpPr>
+            <p:cNvPr id="50" name="Abgerundetes Rechteck 49"/>
+            <p:cNvSpPr/>
+            <p:nvPr/>
+          </p:nvSpPr>
+          <p:spPr>
+            <a:xfrm>
+              <a:off x="168018" y="359757"/>
+              <a:ext cx="2147964" cy="2053659"/>
+            </a:xfrm>
+            <a:prstGeom prst="roundRect">
+              <a:avLst/>
+            </a:prstGeom>
+            <a:solidFill>
+              <a:schemeClr val="accent4">
+                <a:lumMod val="20000"/>
+                <a:lumOff val="80000"/>
+                <a:alpha val="91000"/>
+              </a:schemeClr>
+            </a:solidFill>
+            <a:ln>
+              <a:noFill/>
+            </a:ln>
+          </p:spPr>
+          <p:style>
+            <a:lnRef idx="2">
+              <a:schemeClr val="accent1">
+                <a:shade val="50000"/>
+              </a:schemeClr>
+            </a:lnRef>
+            <a:fillRef idx="1">
+              <a:schemeClr val="accent1"/>
+            </a:fillRef>
+            <a:effectRef idx="0">
+              <a:schemeClr val="accent1"/>
+            </a:effectRef>
+            <a:fontRef idx="minor">
+              <a:schemeClr val="lt1"/>
+            </a:fontRef>
+          </p:style>
+          <p:txBody>
+            <a:bodyPr lIns="36000" tIns="36000" rIns="36000" bIns="36000" rtlCol="0" anchor="ctr"/>
+            <a:lstStyle/>
+            <a:p>
+              <a:pPr algn="ctr"/>
+              <a:endParaRPr lang="de-DE" sz="1400">
+                <a:solidFill>
+                  <a:schemeClr val="tx1"/>
+                </a:solidFill>
+              </a:endParaRPr>
+            </a:p>
+          </p:txBody>
+        </p:sp>
+        <p:sp>
+          <p:nvSpPr>
+            <p:cNvPr id="42" name="Abgerundetes Rechteck 41"/>
+            <p:cNvSpPr/>
+            <p:nvPr/>
+          </p:nvSpPr>
+          <p:spPr>
+            <a:xfrm>
+              <a:off x="304349" y="551893"/>
+              <a:ext cx="1823670" cy="396000"/>
+            </a:xfrm>
+            <a:prstGeom prst="roundRect">
+              <a:avLst/>
+            </a:prstGeom>
+            <a:solidFill>
+              <a:schemeClr val="bg2">
+                <a:alpha val="91000"/>
+              </a:schemeClr>
+            </a:solidFill>
+            <a:ln>
+              <a:noFill/>
+            </a:ln>
+          </p:spPr>
+          <p:style>
+            <a:lnRef idx="2">
+              <a:schemeClr val="accent1">
+                <a:shade val="50000"/>
+              </a:schemeClr>
+            </a:lnRef>
+            <a:fillRef idx="1">
+              <a:schemeClr val="accent1"/>
+            </a:fillRef>
+            <a:effectRef idx="0">
+              <a:schemeClr val="accent1"/>
+            </a:effectRef>
+            <a:fontRef idx="minor">
+              <a:schemeClr val="lt1"/>
+            </a:fontRef>
+          </p:style>
+          <p:txBody>
+            <a:bodyPr lIns="36000" tIns="36000" rIns="36000" bIns="36000" rtlCol="0" anchor="ctr"/>
+            <a:lstStyle/>
+            <a:p>
+              <a:pPr algn="ctr"/>
+              <a:r>
+                <a:rPr lang="de-DE" sz="2000">
+                  <a:solidFill>
+                    <a:schemeClr val="accent5"/>
+                  </a:solidFill>
+                </a:rPr>
+                <a:t>main function</a:t>
+              </a:r>
+              <a:endParaRPr lang="de-DE" sz="2000">
+                <a:solidFill>
+                  <a:schemeClr val="accent5"/>
+                </a:solidFill>
+              </a:endParaRPr>
+            </a:p>
+          </p:txBody>
+        </p:sp>
+        <p:sp>
+          <p:nvSpPr>
+            <p:cNvPr id="43" name="Abgerundetes Rechteck 42"/>
+            <p:cNvSpPr/>
+            <p:nvPr/>
+          </p:nvSpPr>
+          <p:spPr>
+            <a:xfrm>
+              <a:off x="304349" y="1012283"/>
+              <a:ext cx="1823670" cy="396000"/>
+            </a:xfrm>
+            <a:prstGeom prst="roundRect">
+              <a:avLst/>
+            </a:prstGeom>
+            <a:solidFill>
+              <a:schemeClr val="bg2">
+                <a:alpha val="91000"/>
+              </a:schemeClr>
+            </a:solidFill>
+            <a:ln>
+              <a:noFill/>
+            </a:ln>
+          </p:spPr>
+          <p:style>
+            <a:lnRef idx="2">
+              <a:schemeClr val="accent1">
+                <a:shade val="50000"/>
+              </a:schemeClr>
+            </a:lnRef>
+            <a:fillRef idx="1">
+              <a:schemeClr val="accent1"/>
+            </a:fillRef>
+            <a:effectRef idx="0">
+              <a:schemeClr val="accent1"/>
+            </a:effectRef>
+            <a:fontRef idx="minor">
+              <a:schemeClr val="lt1"/>
+            </a:fontRef>
+          </p:style>
+          <p:txBody>
+            <a:bodyPr lIns="36000" tIns="36000" rIns="36000" bIns="36000" rtlCol="0" anchor="ctr"/>
+            <a:lstStyle/>
+            <a:p>
+              <a:pPr algn="ctr"/>
+              <a:r>
+                <a:rPr lang="de-DE" sz="2000">
+                  <a:solidFill>
+                    <a:schemeClr val="accent2"/>
+                  </a:solidFill>
+                </a:rPr>
+                <a:t>helper function</a:t>
+              </a:r>
+              <a:endParaRPr lang="de-DE" sz="2000">
+                <a:solidFill>
+                  <a:schemeClr val="accent2"/>
+                </a:solidFill>
+              </a:endParaRPr>
+            </a:p>
+          </p:txBody>
+        </p:sp>
+        <p:sp>
+          <p:nvSpPr>
+            <p:cNvPr id="48" name="Abgerundetes Rechteck 47"/>
+            <p:cNvSpPr/>
+            <p:nvPr/>
+          </p:nvSpPr>
+          <p:spPr>
+            <a:xfrm>
+              <a:off x="304349" y="1472673"/>
+              <a:ext cx="1823670" cy="396000"/>
+            </a:xfrm>
+            <a:prstGeom prst="roundRect">
+              <a:avLst/>
+            </a:prstGeom>
+            <a:solidFill>
+              <a:schemeClr val="bg2">
+                <a:alpha val="91000"/>
+              </a:schemeClr>
+            </a:solidFill>
+            <a:ln>
+              <a:noFill/>
+            </a:ln>
+          </p:spPr>
+          <p:style>
+            <a:lnRef idx="2">
+              <a:schemeClr val="accent1">
+                <a:shade val="50000"/>
+              </a:schemeClr>
+            </a:lnRef>
+            <a:fillRef idx="1">
+              <a:schemeClr val="accent1"/>
+            </a:fillRef>
+            <a:effectRef idx="0">
+              <a:schemeClr val="accent1"/>
+            </a:effectRef>
+            <a:fontRef idx="minor">
+              <a:schemeClr val="lt1"/>
+            </a:fontRef>
+          </p:style>
+          <p:txBody>
+            <a:bodyPr lIns="36000" tIns="36000" rIns="36000" bIns="36000" rtlCol="0" anchor="ctr"/>
+            <a:lstStyle/>
+            <a:p>
+              <a:pPr algn="ctr"/>
+              <a:r>
+                <a:rPr lang="de-DE" sz="2000">
+                  <a:solidFill>
+                    <a:schemeClr val="accent6">
+                      <a:lumMod val="60000"/>
+                      <a:lumOff val="40000"/>
+                    </a:schemeClr>
+                  </a:solidFill>
+                </a:rPr>
+                <a:t>dataset</a:t>
+              </a:r>
+              <a:endParaRPr lang="de-DE" sz="2000">
+                <a:solidFill>
+                  <a:schemeClr val="accent6">
+                    <a:lumMod val="60000"/>
+                    <a:lumOff val="40000"/>
+                  </a:schemeClr>
+                </a:solidFill>
+              </a:endParaRPr>
+            </a:p>
+          </p:txBody>
+        </p:sp>
+        <p:sp>
+          <p:nvSpPr>
+            <p:cNvPr id="49" name="Rechteck 48"/>
+            <p:cNvSpPr/>
+            <p:nvPr/>
+          </p:nvSpPr>
+          <p:spPr>
+            <a:xfrm>
+              <a:off x="304349" y="1927576"/>
+              <a:ext cx="1823670" cy="276999"/>
+            </a:xfrm>
+            <a:prstGeom prst="rect">
+              <a:avLst/>
+            </a:prstGeom>
+            <a:ln>
+              <a:solidFill>
+                <a:schemeClr val="bg2"/>
+              </a:solidFill>
+            </a:ln>
+          </p:spPr>
+          <p:txBody>
+            <a:bodyPr wrap="square">
+              <a:spAutoFit/>
+            </a:bodyPr>
+            <a:lstStyle/>
+            <a:p>
+              <a:pPr algn="ctr"/>
+              <a:r>
+                <a:rPr lang="de-DE" sz="1200" b="1"/>
+                <a:t>(main</a:t>
+              </a:r>
+              <a:r>
+                <a:rPr lang="de-DE" sz="1200" b="1"/>
+                <a:t>)</a:t>
+              </a:r>
+              <a:r>
+                <a:rPr lang="de-DE" sz="1200"/>
+                <a:t> </a:t>
+              </a:r>
+              <a:r>
+                <a:rPr lang="de-DE" sz="1200" smtClean="0"/>
+                <a:t>argument</a:t>
+              </a:r>
+              <a:endParaRPr lang="de-DE" sz="1200"/>
+            </a:p>
+          </p:txBody>
+        </p:sp>
+      </p:grpSp>
+      <p:sp>
+        <p:nvSpPr>
+          <p:cNvPr id="72" name="Abgerundetes Rechteck 71"/>
+          <p:cNvSpPr/>
+          <p:nvPr/>
+        </p:nvSpPr>
+        <p:spPr>
+          <a:xfrm>
+            <a:off x="6840512" y="225684"/>
+            <a:ext cx="2101121" cy="511746"/>
+          </a:xfrm>
+          <a:prstGeom prst="roundRect">
+            <a:avLst/>
+          </a:prstGeom>
+          <a:solidFill>
+            <a:schemeClr val="accent4">
+              <a:lumMod val="20000"/>
+              <a:lumOff val="80000"/>
+              <a:alpha val="91000"/>
+            </a:schemeClr>
+          </a:solidFill>
+          <a:ln>
+            <a:noFill/>
+          </a:ln>
+        </p:spPr>
+        <p:style>
+          <a:lnRef idx="2">
+            <a:schemeClr val="accent1">
+              <a:shade val="50000"/>
+            </a:schemeClr>
+          </a:lnRef>
+          <a:fillRef idx="1">
+            <a:schemeClr val="accent1"/>
+          </a:fillRef>
+          <a:effectRef idx="0">
+            <a:schemeClr val="accent1"/>
+          </a:effectRef>
+          <a:fontRef idx="minor">
+            <a:schemeClr val="lt1"/>
+          </a:fontRef>
+        </p:style>
+        <p:txBody>
+          <a:bodyPr lIns="36000" tIns="36000" rIns="36000" bIns="36000" rtlCol="0" anchor="ctr"/>
+          <a:lstStyle/>
+          <a:p>
+            <a:pPr algn="ctr"/>
+            <a:r>
+              <a:rPr lang="de-DE" sz="1400">
+                <a:solidFill>
+                  <a:schemeClr val="tx1"/>
+                </a:solidFill>
+                <a:hlinkClick r:id="rId2"/>
+              </a:rPr>
+              <a:t>github.com/brry/rdwd</a:t>
+            </a:r>
+            <a:r>
+              <a:rPr lang="de-DE" sz="1400">
+                <a:solidFill>
+                  <a:schemeClr val="tx1"/>
+                </a:solidFill>
+              </a:rPr>
+              <a:t> </a:t>
+            </a:r>
+            <a:endParaRPr lang="de-DE" sz="1400">
+              <a:solidFill>
+                <a:schemeClr val="tx1"/>
+              </a:solidFill>
+            </a:endParaRPr>
+          </a:p>
+        </p:txBody>
+      </p:sp>
     </p:spTree>
     <p:extLst>
       <p:ext uri="{BB962C8B-B14F-4D97-AF65-F5344CB8AC3E}">

</xml_diff>